<commit_message>
Class 3 slides update
</commit_message>
<xml_diff>
--- a/Collaterals/IntelMakersUniversity - class 3.pptx
+++ b/Collaterals/IntelMakersUniversity - class 3.pptx
@@ -6,10 +6,10 @@
     <p:sldMasterId id="2147483691" r:id="rId2"/>
   </p:sldMasterIdLst>
   <p:notesMasterIdLst>
-    <p:notesMasterId r:id="rId12"/>
+    <p:notesMasterId r:id="rId22"/>
   </p:notesMasterIdLst>
   <p:handoutMasterIdLst>
-    <p:handoutMasterId r:id="rId13"/>
+    <p:handoutMasterId r:id="rId23"/>
   </p:handoutMasterIdLst>
   <p:sldIdLst>
     <p:sldId id="318" r:id="rId3"/>
@@ -19,8 +19,18 @@
     <p:sldId id="350" r:id="rId7"/>
     <p:sldId id="352" r:id="rId8"/>
     <p:sldId id="354" r:id="rId9"/>
-    <p:sldId id="353" r:id="rId10"/>
-    <p:sldId id="294" r:id="rId11"/>
+    <p:sldId id="367" r:id="rId10"/>
+    <p:sldId id="361" r:id="rId11"/>
+    <p:sldId id="368" r:id="rId12"/>
+    <p:sldId id="366" r:id="rId13"/>
+    <p:sldId id="353" r:id="rId14"/>
+    <p:sldId id="362" r:id="rId15"/>
+    <p:sldId id="356" r:id="rId16"/>
+    <p:sldId id="357" r:id="rId17"/>
+    <p:sldId id="363" r:id="rId18"/>
+    <p:sldId id="364" r:id="rId19"/>
+    <p:sldId id="359" r:id="rId20"/>
+    <p:sldId id="294" r:id="rId21"/>
   </p:sldIdLst>
   <p:sldSz cx="9144000" cy="5143500" type="screen16x9"/>
   <p:notesSz cx="6858000" cy="9144000"/>
@@ -12206,6 +12216,3848 @@
 </p:sld>
 </file>
 
+<file path=ppt/slides/slide10.xml><?xml version="1.0" encoding="utf-8"?>
+<p:sld xmlns:a="http://schemas.openxmlformats.org/drawingml/2006/main" xmlns:r="http://schemas.openxmlformats.org/officeDocument/2006/relationships" xmlns:p="http://schemas.openxmlformats.org/presentationml/2006/main">
+  <p:cSld>
+    <p:spTree>
+      <p:nvGrpSpPr>
+        <p:cNvPr id="1" name=""/>
+        <p:cNvGrpSpPr/>
+        <p:nvPr/>
+      </p:nvGrpSpPr>
+      <p:grpSpPr>
+        <a:xfrm>
+          <a:off x="0" y="0"/>
+          <a:ext cx="0" cy="0"/>
+          <a:chOff x="0" y="0"/>
+          <a:chExt cx="0" cy="0"/>
+        </a:xfrm>
+      </p:grpSpPr>
+      <p:sp>
+        <p:nvSpPr>
+          <p:cNvPr id="2" name="Slide Number Placeholder 1">
+            <a:extLst>
+              <a:ext uri="{FF2B5EF4-FFF2-40B4-BE49-F238E27FC236}">
+                <a16:creationId xmlns:a16="http://schemas.microsoft.com/office/drawing/2014/main" id="{8B20FB39-703A-48E0-828C-2B17F1058F82}"/>
+              </a:ext>
+            </a:extLst>
+          </p:cNvPr>
+          <p:cNvSpPr>
+            <a:spLocks noGrp="1"/>
+          </p:cNvSpPr>
+          <p:nvPr>
+            <p:ph type="sldNum" sz="quarter" idx="12"/>
+          </p:nvPr>
+        </p:nvSpPr>
+        <p:spPr/>
+        <p:txBody>
+          <a:bodyPr/>
+          <a:lstStyle/>
+          <a:p>
+            <a:fld id="{EE2556C5-CE8C-6547-B838-EA80C61A4AF7}" type="slidenum">
+              <a:rPr lang="en-US" smtClean="0"/>
+              <a:pPr/>
+              <a:t>10</a:t>
+            </a:fld>
+            <a:endParaRPr lang="en-US" dirty="0"/>
+          </a:p>
+        </p:txBody>
+      </p:sp>
+      <p:sp>
+        <p:nvSpPr>
+          <p:cNvPr id="3" name="Title 2">
+            <a:extLst>
+              <a:ext uri="{FF2B5EF4-FFF2-40B4-BE49-F238E27FC236}">
+                <a16:creationId xmlns:a16="http://schemas.microsoft.com/office/drawing/2014/main" id="{D50145E5-5498-46C8-89CD-9BD450C5FC0B}"/>
+              </a:ext>
+            </a:extLst>
+          </p:cNvPr>
+          <p:cNvSpPr>
+            <a:spLocks noGrp="1"/>
+          </p:cNvSpPr>
+          <p:nvPr>
+            <p:ph type="title"/>
+          </p:nvPr>
+        </p:nvSpPr>
+        <p:spPr>
+          <a:xfrm>
+            <a:off x="275101" y="80010"/>
+            <a:ext cx="8229600" cy="390507"/>
+          </a:xfrm>
+        </p:spPr>
+        <p:txBody>
+          <a:bodyPr/>
+          <a:lstStyle/>
+          <a:p>
+            <a:r>
+              <a:rPr lang="en-US" sz="3600" dirty="0"/>
+              <a:t>Inheritance</a:t>
+            </a:r>
+            <a:br>
+              <a:rPr lang="en-US" sz="3600" dirty="0"/>
+            </a:br>
+            <a:endParaRPr lang="en-US" dirty="0"/>
+          </a:p>
+        </p:txBody>
+      </p:sp>
+      <p:pic>
+        <p:nvPicPr>
+          <p:cNvPr id="7" name="Picture 6">
+            <a:extLst>
+              <a:ext uri="{FF2B5EF4-FFF2-40B4-BE49-F238E27FC236}">
+                <a16:creationId xmlns:a16="http://schemas.microsoft.com/office/drawing/2014/main" id="{A234A2E4-4BB4-457A-9434-EDCC1B3A553D}"/>
+              </a:ext>
+            </a:extLst>
+          </p:cNvPr>
+          <p:cNvPicPr>
+            <a:picLocks noChangeAspect="1"/>
+          </p:cNvPicPr>
+          <p:nvPr/>
+        </p:nvPicPr>
+        <p:blipFill>
+          <a:blip r:embed="rId2"/>
+          <a:stretch>
+            <a:fillRect/>
+          </a:stretch>
+        </p:blipFill>
+        <p:spPr>
+          <a:xfrm>
+            <a:off x="275101" y="470517"/>
+            <a:ext cx="5115485" cy="1567453"/>
+          </a:xfrm>
+          <a:prstGeom prst="rect">
+            <a:avLst/>
+          </a:prstGeom>
+        </p:spPr>
+      </p:pic>
+      <p:pic>
+        <p:nvPicPr>
+          <p:cNvPr id="8" name="Picture 7">
+            <a:extLst>
+              <a:ext uri="{FF2B5EF4-FFF2-40B4-BE49-F238E27FC236}">
+                <a16:creationId xmlns:a16="http://schemas.microsoft.com/office/drawing/2014/main" id="{B24E72D9-DB0B-4836-9504-D875D85C00C8}"/>
+              </a:ext>
+            </a:extLst>
+          </p:cNvPr>
+          <p:cNvPicPr>
+            <a:picLocks noChangeAspect="1"/>
+          </p:cNvPicPr>
+          <p:nvPr/>
+        </p:nvPicPr>
+        <p:blipFill>
+          <a:blip r:embed="rId3"/>
+          <a:stretch>
+            <a:fillRect/>
+          </a:stretch>
+        </p:blipFill>
+        <p:spPr>
+          <a:xfrm>
+            <a:off x="275101" y="2172933"/>
+            <a:ext cx="7359650" cy="2134179"/>
+          </a:xfrm>
+          <a:prstGeom prst="rect">
+            <a:avLst/>
+          </a:prstGeom>
+        </p:spPr>
+      </p:pic>
+    </p:spTree>
+    <p:extLst>
+      <p:ext uri="{BB962C8B-B14F-4D97-AF65-F5344CB8AC3E}">
+        <p14:creationId xmlns:p14="http://schemas.microsoft.com/office/powerpoint/2010/main" val="2353112151"/>
+      </p:ext>
+    </p:extLst>
+  </p:cSld>
+  <p:clrMapOvr>
+    <a:masterClrMapping/>
+  </p:clrMapOvr>
+  <mc:AlternateContent xmlns:mc="http://schemas.openxmlformats.org/markup-compatibility/2006" xmlns:p14="http://schemas.microsoft.com/office/powerpoint/2010/main">
+    <mc:Choice Requires="p14">
+      <p:transition spd="med" p14:dur="700">
+        <p:fade/>
+      </p:transition>
+    </mc:Choice>
+    <mc:Fallback xmlns="">
+      <p:transition spd="med">
+        <p:fade/>
+      </p:transition>
+    </mc:Fallback>
+  </mc:AlternateContent>
+</p:sld>
+</file>
+
+<file path=ppt/slides/slide11.xml><?xml version="1.0" encoding="utf-8"?>
+<p:sld xmlns:a="http://schemas.openxmlformats.org/drawingml/2006/main" xmlns:r="http://schemas.openxmlformats.org/officeDocument/2006/relationships" xmlns:p="http://schemas.openxmlformats.org/presentationml/2006/main">
+  <p:cSld>
+    <p:spTree>
+      <p:nvGrpSpPr>
+        <p:cNvPr id="1" name=""/>
+        <p:cNvGrpSpPr/>
+        <p:nvPr/>
+      </p:nvGrpSpPr>
+      <p:grpSpPr>
+        <a:xfrm>
+          <a:off x="0" y="0"/>
+          <a:ext cx="0" cy="0"/>
+          <a:chOff x="0" y="0"/>
+          <a:chExt cx="0" cy="0"/>
+        </a:xfrm>
+      </p:grpSpPr>
+      <p:sp>
+        <p:nvSpPr>
+          <p:cNvPr id="2" name="Slide Number Placeholder 1">
+            <a:extLst>
+              <a:ext uri="{FF2B5EF4-FFF2-40B4-BE49-F238E27FC236}">
+                <a16:creationId xmlns:a16="http://schemas.microsoft.com/office/drawing/2014/main" id="{8B20FB39-703A-48E0-828C-2B17F1058F82}"/>
+              </a:ext>
+            </a:extLst>
+          </p:cNvPr>
+          <p:cNvSpPr>
+            <a:spLocks noGrp="1"/>
+          </p:cNvSpPr>
+          <p:nvPr>
+            <p:ph type="sldNum" sz="quarter" idx="12"/>
+          </p:nvPr>
+        </p:nvSpPr>
+        <p:spPr/>
+        <p:txBody>
+          <a:bodyPr/>
+          <a:lstStyle/>
+          <a:p>
+            <a:fld id="{EE2556C5-CE8C-6547-B838-EA80C61A4AF7}" type="slidenum">
+              <a:rPr lang="en-US" smtClean="0"/>
+              <a:pPr/>
+              <a:t>11</a:t>
+            </a:fld>
+            <a:endParaRPr lang="en-US" dirty="0"/>
+          </a:p>
+        </p:txBody>
+      </p:sp>
+      <p:sp>
+        <p:nvSpPr>
+          <p:cNvPr id="3" name="Title 2">
+            <a:extLst>
+              <a:ext uri="{FF2B5EF4-FFF2-40B4-BE49-F238E27FC236}">
+                <a16:creationId xmlns:a16="http://schemas.microsoft.com/office/drawing/2014/main" id="{D50145E5-5498-46C8-89CD-9BD450C5FC0B}"/>
+              </a:ext>
+            </a:extLst>
+          </p:cNvPr>
+          <p:cNvSpPr>
+            <a:spLocks noGrp="1"/>
+          </p:cNvSpPr>
+          <p:nvPr>
+            <p:ph type="title"/>
+          </p:nvPr>
+        </p:nvSpPr>
+        <p:spPr>
+          <a:xfrm>
+            <a:off x="275101" y="80010"/>
+            <a:ext cx="8229600" cy="390507"/>
+          </a:xfrm>
+        </p:spPr>
+        <p:txBody>
+          <a:bodyPr/>
+          <a:lstStyle/>
+          <a:p>
+            <a:r>
+              <a:rPr lang="en-US" sz="3600" dirty="0"/>
+              <a:t>Function Overriding</a:t>
+            </a:r>
+            <a:br>
+              <a:rPr lang="en-US" sz="3600" dirty="0"/>
+            </a:br>
+            <a:endParaRPr lang="en-US" dirty="0"/>
+          </a:p>
+        </p:txBody>
+      </p:sp>
+      <p:sp>
+        <p:nvSpPr>
+          <p:cNvPr id="4" name="Content Placeholder 3">
+            <a:extLst>
+              <a:ext uri="{FF2B5EF4-FFF2-40B4-BE49-F238E27FC236}">
+                <a16:creationId xmlns:a16="http://schemas.microsoft.com/office/drawing/2014/main" id="{4A82F0A8-9ABA-45A1-B114-4D9BE3C3D467}"/>
+              </a:ext>
+            </a:extLst>
+          </p:cNvPr>
+          <p:cNvSpPr>
+            <a:spLocks noGrp="1"/>
+          </p:cNvSpPr>
+          <p:nvPr>
+            <p:ph sz="quarter" idx="13"/>
+          </p:nvPr>
+        </p:nvSpPr>
+        <p:spPr>
+          <a:xfrm>
+            <a:off x="275101" y="652910"/>
+            <a:ext cx="8228012" cy="4010826"/>
+          </a:xfrm>
+        </p:spPr>
+        <p:txBody>
+          <a:bodyPr/>
+          <a:lstStyle/>
+          <a:p>
+            <a:pPr marL="171450" indent="-171450">
+              <a:spcBef>
+                <a:spcPts val="300"/>
+              </a:spcBef>
+              <a:buFont typeface="Arial" panose="020B0604020202020204" pitchFamily="34" charset="0"/>
+              <a:buChar char="•"/>
+            </a:pPr>
+            <a:r>
+              <a:rPr lang="en-US" sz="1200" dirty="0"/>
+              <a:t>A child class inherits data and function members of parent class</a:t>
+            </a:r>
+          </a:p>
+          <a:p>
+            <a:pPr marL="171450" indent="-171450">
+              <a:spcBef>
+                <a:spcPts val="300"/>
+              </a:spcBef>
+              <a:buFont typeface="Arial" panose="020B0604020202020204" pitchFamily="34" charset="0"/>
+              <a:buChar char="•"/>
+            </a:pPr>
+            <a:r>
+              <a:rPr lang="en-US" sz="1200" dirty="0"/>
+              <a:t>Overriding is a redefinition of base class function in its derived class </a:t>
+            </a:r>
+          </a:p>
+          <a:p>
+            <a:pPr marL="396875" lvl="1" indent="-171450">
+              <a:spcBef>
+                <a:spcPts val="300"/>
+              </a:spcBef>
+              <a:buFont typeface="Arial" panose="020B0604020202020204" pitchFamily="34" charset="0"/>
+              <a:buChar char="•"/>
+            </a:pPr>
+            <a:r>
+              <a:rPr lang="en-US" sz="1200" dirty="0"/>
+              <a:t>The two functions have the same signature</a:t>
+            </a:r>
+          </a:p>
+          <a:p>
+            <a:pPr marL="396875" lvl="1" indent="-171450">
+              <a:spcBef>
+                <a:spcPts val="300"/>
+              </a:spcBef>
+              <a:buFont typeface="Arial" panose="020B0604020202020204" pitchFamily="34" charset="0"/>
+              <a:buChar char="•"/>
+            </a:pPr>
+            <a:r>
+              <a:rPr lang="en-US" sz="1200" dirty="0"/>
+              <a:t>It can only be done in derived class</a:t>
+            </a:r>
+          </a:p>
+          <a:p>
+            <a:pPr marL="171450" indent="-171450">
+              <a:spcBef>
+                <a:spcPts val="300"/>
+              </a:spcBef>
+              <a:buFont typeface="Arial" panose="020B0604020202020204" pitchFamily="34" charset="0"/>
+              <a:buChar char="•"/>
+            </a:pPr>
+            <a:r>
+              <a:rPr lang="en-US" sz="1200" dirty="0"/>
+              <a:t>Used to override the functionality in the child class</a:t>
+            </a:r>
+          </a:p>
+          <a:p>
+            <a:pPr marL="171450" indent="-171450">
+              <a:spcBef>
+                <a:spcPts val="300"/>
+              </a:spcBef>
+              <a:buFont typeface="Arial" panose="020B0604020202020204" pitchFamily="34" charset="0"/>
+              <a:buChar char="•"/>
+            </a:pPr>
+            <a:r>
+              <a:rPr lang="en-US" sz="1200" dirty="0"/>
+              <a:t>To access the overridden function of the base class: </a:t>
+            </a:r>
+          </a:p>
+          <a:p>
+            <a:pPr marL="396875" lvl="1" indent="-171450">
+              <a:spcBef>
+                <a:spcPts val="300"/>
+              </a:spcBef>
+              <a:buFont typeface="Arial" panose="020B0604020202020204" pitchFamily="34" charset="0"/>
+              <a:buChar char="•"/>
+            </a:pPr>
+            <a:r>
+              <a:rPr lang="en-US" sz="1200" dirty="0"/>
+              <a:t>scope resolution operator :: is used</a:t>
+            </a:r>
+          </a:p>
+          <a:p>
+            <a:pPr marL="396875" lvl="1" indent="-171450">
+              <a:spcBef>
+                <a:spcPts val="300"/>
+              </a:spcBef>
+              <a:buFont typeface="Arial" panose="020B0604020202020204" pitchFamily="34" charset="0"/>
+              <a:buChar char="•"/>
+            </a:pPr>
+            <a:r>
+              <a:rPr lang="en-US" sz="1200" dirty="0"/>
+              <a:t>Example:</a:t>
+            </a:r>
+          </a:p>
+          <a:p>
+            <a:pPr marL="742950" lvl="2" indent="-171450">
+              <a:spcBef>
+                <a:spcPts val="300"/>
+              </a:spcBef>
+              <a:buFont typeface="Arial" panose="020B0604020202020204" pitchFamily="34" charset="0"/>
+              <a:buChar char="•"/>
+            </a:pPr>
+            <a:r>
+              <a:rPr lang="en-US" sz="1200" dirty="0"/>
+              <a:t>If you want to access </a:t>
+            </a:r>
+            <a:r>
+              <a:rPr lang="en-US" sz="1200" dirty="0" err="1"/>
+              <a:t>getData</a:t>
+            </a:r>
+            <a:r>
+              <a:rPr lang="en-US" sz="1200" dirty="0"/>
+              <a:t>() of the base class:</a:t>
+            </a:r>
+          </a:p>
+          <a:p>
+            <a:pPr marL="742950" lvl="2" indent="-171450">
+              <a:spcBef>
+                <a:spcPts val="300"/>
+              </a:spcBef>
+              <a:buFont typeface="Arial" panose="020B0604020202020204" pitchFamily="34" charset="0"/>
+              <a:buChar char="•"/>
+            </a:pPr>
+            <a:r>
+              <a:rPr lang="en-US" sz="1200" dirty="0"/>
+              <a:t>Use the following in the derived class:</a:t>
+            </a:r>
+          </a:p>
+          <a:p>
+            <a:pPr marL="742950" lvl="2" indent="-171450">
+              <a:spcBef>
+                <a:spcPts val="300"/>
+              </a:spcBef>
+              <a:buFont typeface="Arial" panose="020B0604020202020204" pitchFamily="34" charset="0"/>
+              <a:buChar char="•"/>
+            </a:pPr>
+            <a:endParaRPr lang="en-US" sz="1200" dirty="0"/>
+          </a:p>
+          <a:p>
+            <a:pPr lvl="2" indent="0">
+              <a:spcBef>
+                <a:spcPts val="300"/>
+              </a:spcBef>
+              <a:buNone/>
+            </a:pPr>
+            <a:endParaRPr lang="en-US" sz="1200" dirty="0"/>
+          </a:p>
+          <a:p>
+            <a:pPr marL="171450" indent="-171450">
+              <a:spcBef>
+                <a:spcPts val="300"/>
+              </a:spcBef>
+              <a:buFont typeface="Arial" panose="020B0604020202020204" pitchFamily="34" charset="0"/>
+              <a:buChar char="•"/>
+            </a:pPr>
+            <a:endParaRPr lang="en-US" sz="1200" dirty="0"/>
+          </a:p>
+          <a:p>
+            <a:pPr marL="171450" indent="-171450">
+              <a:spcBef>
+                <a:spcPts val="300"/>
+              </a:spcBef>
+              <a:buFont typeface="Arial" panose="020B0604020202020204" pitchFamily="34" charset="0"/>
+              <a:buChar char="•"/>
+            </a:pPr>
+            <a:endParaRPr lang="en-US" sz="1200" dirty="0"/>
+          </a:p>
+          <a:p>
+            <a:pPr marL="171450" indent="-171450">
+              <a:spcBef>
+                <a:spcPts val="300"/>
+              </a:spcBef>
+              <a:buFont typeface="Arial" panose="020B0604020202020204" pitchFamily="34" charset="0"/>
+              <a:buChar char="•"/>
+            </a:pPr>
+            <a:endParaRPr lang="en-US" sz="1200" dirty="0"/>
+          </a:p>
+          <a:p>
+            <a:pPr marL="171450" indent="-171450">
+              <a:spcBef>
+                <a:spcPts val="300"/>
+              </a:spcBef>
+              <a:buFont typeface="Arial" panose="020B0604020202020204" pitchFamily="34" charset="0"/>
+              <a:buChar char="•"/>
+            </a:pPr>
+            <a:endParaRPr lang="en-US" sz="1200" dirty="0"/>
+          </a:p>
+          <a:p>
+            <a:pPr marL="171450" indent="-171450">
+              <a:spcBef>
+                <a:spcPts val="300"/>
+              </a:spcBef>
+              <a:buFont typeface="Arial" panose="020B0604020202020204" pitchFamily="34" charset="0"/>
+              <a:buChar char="•"/>
+            </a:pPr>
+            <a:endParaRPr lang="en-US" sz="1200" dirty="0"/>
+          </a:p>
+        </p:txBody>
+      </p:sp>
+      <p:pic>
+        <p:nvPicPr>
+          <p:cNvPr id="5" name="Picture 4">
+            <a:extLst>
+              <a:ext uri="{FF2B5EF4-FFF2-40B4-BE49-F238E27FC236}">
+                <a16:creationId xmlns:a16="http://schemas.microsoft.com/office/drawing/2014/main" id="{C9C8B9CC-D5C2-4C03-8B75-8AFB3C1A676C}"/>
+              </a:ext>
+            </a:extLst>
+          </p:cNvPr>
+          <p:cNvPicPr>
+            <a:picLocks noChangeAspect="1"/>
+          </p:cNvPicPr>
+          <p:nvPr/>
+        </p:nvPicPr>
+        <p:blipFill>
+          <a:blip r:embed="rId2"/>
+          <a:stretch>
+            <a:fillRect/>
+          </a:stretch>
+        </p:blipFill>
+        <p:spPr>
+          <a:xfrm>
+            <a:off x="4502727" y="1066657"/>
+            <a:ext cx="4548848" cy="3459018"/>
+          </a:xfrm>
+          <a:prstGeom prst="rect">
+            <a:avLst/>
+          </a:prstGeom>
+        </p:spPr>
+      </p:pic>
+      <p:pic>
+        <p:nvPicPr>
+          <p:cNvPr id="8" name="Picture 7">
+            <a:extLst>
+              <a:ext uri="{FF2B5EF4-FFF2-40B4-BE49-F238E27FC236}">
+                <a16:creationId xmlns:a16="http://schemas.microsoft.com/office/drawing/2014/main" id="{B34FFC12-B2B7-4468-AF42-02E4111CBF39}"/>
+              </a:ext>
+            </a:extLst>
+          </p:cNvPr>
+          <p:cNvPicPr>
+            <a:picLocks noChangeAspect="1"/>
+          </p:cNvPicPr>
+          <p:nvPr/>
+        </p:nvPicPr>
+        <p:blipFill>
+          <a:blip r:embed="rId3"/>
+          <a:stretch>
+            <a:fillRect/>
+          </a:stretch>
+        </p:blipFill>
+        <p:spPr>
+          <a:xfrm>
+            <a:off x="1198562" y="2876694"/>
+            <a:ext cx="1971675" cy="295275"/>
+          </a:xfrm>
+          <a:prstGeom prst="rect">
+            <a:avLst/>
+          </a:prstGeom>
+        </p:spPr>
+      </p:pic>
+    </p:spTree>
+    <p:extLst>
+      <p:ext uri="{BB962C8B-B14F-4D97-AF65-F5344CB8AC3E}">
+        <p14:creationId xmlns:p14="http://schemas.microsoft.com/office/powerpoint/2010/main" val="4116164912"/>
+      </p:ext>
+    </p:extLst>
+  </p:cSld>
+  <p:clrMapOvr>
+    <a:masterClrMapping/>
+  </p:clrMapOvr>
+  <mc:AlternateContent xmlns:mc="http://schemas.openxmlformats.org/markup-compatibility/2006" xmlns:p14="http://schemas.microsoft.com/office/powerpoint/2010/main">
+    <mc:Choice Requires="p14">
+      <p:transition spd="med" p14:dur="700">
+        <p:fade/>
+      </p:transition>
+    </mc:Choice>
+    <mc:Fallback xmlns="">
+      <p:transition spd="med">
+        <p:fade/>
+      </p:transition>
+    </mc:Fallback>
+  </mc:AlternateContent>
+</p:sld>
+</file>
+
+<file path=ppt/slides/slide12.xml><?xml version="1.0" encoding="utf-8"?>
+<p:sld xmlns:a="http://schemas.openxmlformats.org/drawingml/2006/main" xmlns:r="http://schemas.openxmlformats.org/officeDocument/2006/relationships" xmlns:p="http://schemas.openxmlformats.org/presentationml/2006/main">
+  <p:cSld>
+    <p:spTree>
+      <p:nvGrpSpPr>
+        <p:cNvPr id="1" name=""/>
+        <p:cNvGrpSpPr/>
+        <p:nvPr/>
+      </p:nvGrpSpPr>
+      <p:grpSpPr>
+        <a:xfrm>
+          <a:off x="0" y="0"/>
+          <a:ext cx="0" cy="0"/>
+          <a:chOff x="0" y="0"/>
+          <a:chExt cx="0" cy="0"/>
+        </a:xfrm>
+      </p:grpSpPr>
+      <p:sp>
+        <p:nvSpPr>
+          <p:cNvPr id="2" name="Slide Number Placeholder 1">
+            <a:extLst>
+              <a:ext uri="{FF2B5EF4-FFF2-40B4-BE49-F238E27FC236}">
+                <a16:creationId xmlns:a16="http://schemas.microsoft.com/office/drawing/2014/main" id="{8B20FB39-703A-48E0-828C-2B17F1058F82}"/>
+              </a:ext>
+            </a:extLst>
+          </p:cNvPr>
+          <p:cNvSpPr>
+            <a:spLocks noGrp="1"/>
+          </p:cNvSpPr>
+          <p:nvPr>
+            <p:ph type="sldNum" sz="quarter" idx="12"/>
+          </p:nvPr>
+        </p:nvSpPr>
+        <p:spPr/>
+        <p:txBody>
+          <a:bodyPr/>
+          <a:lstStyle/>
+          <a:p>
+            <a:fld id="{EE2556C5-CE8C-6547-B838-EA80C61A4AF7}" type="slidenum">
+              <a:rPr lang="en-US" smtClean="0"/>
+              <a:pPr/>
+              <a:t>12</a:t>
+            </a:fld>
+            <a:endParaRPr lang="en-US" dirty="0"/>
+          </a:p>
+        </p:txBody>
+      </p:sp>
+      <p:sp>
+        <p:nvSpPr>
+          <p:cNvPr id="3" name="Title 2">
+            <a:extLst>
+              <a:ext uri="{FF2B5EF4-FFF2-40B4-BE49-F238E27FC236}">
+                <a16:creationId xmlns:a16="http://schemas.microsoft.com/office/drawing/2014/main" id="{D50145E5-5498-46C8-89CD-9BD450C5FC0B}"/>
+              </a:ext>
+            </a:extLst>
+          </p:cNvPr>
+          <p:cNvSpPr>
+            <a:spLocks noGrp="1"/>
+          </p:cNvSpPr>
+          <p:nvPr>
+            <p:ph type="title"/>
+          </p:nvPr>
+        </p:nvSpPr>
+        <p:spPr>
+          <a:xfrm>
+            <a:off x="275101" y="80010"/>
+            <a:ext cx="8229600" cy="390507"/>
+          </a:xfrm>
+        </p:spPr>
+        <p:txBody>
+          <a:bodyPr/>
+          <a:lstStyle/>
+          <a:p>
+            <a:pPr>
+              <a:spcBef>
+                <a:spcPts val="600"/>
+              </a:spcBef>
+            </a:pPr>
+            <a:r>
+              <a:rPr lang="en-US" sz="3600" dirty="0"/>
+              <a:t>Static Instance VS dynamic allocation (. Vs -&gt;)</a:t>
+            </a:r>
+          </a:p>
+        </p:txBody>
+      </p:sp>
+      <mc:AlternateContent xmlns:mc="http://schemas.openxmlformats.org/markup-compatibility/2006">
+        <mc:Choice xmlns:a14="http://schemas.microsoft.com/office/drawing/2010/main" Requires="a14">
+          <p:sp>
+            <p:nvSpPr>
+              <p:cNvPr id="4" name="Content Placeholder 3">
+                <a:extLst>
+                  <a:ext uri="{FF2B5EF4-FFF2-40B4-BE49-F238E27FC236}">
+                    <a16:creationId xmlns:a16="http://schemas.microsoft.com/office/drawing/2014/main" id="{4A82F0A8-9ABA-45A1-B114-4D9BE3C3D467}"/>
+                  </a:ext>
+                </a:extLst>
+              </p:cNvPr>
+              <p:cNvSpPr>
+                <a:spLocks noGrp="1"/>
+              </p:cNvSpPr>
+              <p:nvPr>
+                <p:ph sz="quarter" idx="13"/>
+              </p:nvPr>
+            </p:nvSpPr>
+            <p:spPr>
+              <a:xfrm>
+                <a:off x="275101" y="652910"/>
+                <a:ext cx="8228012" cy="4010826"/>
+              </a:xfrm>
+            </p:spPr>
+            <p:txBody>
+              <a:bodyPr/>
+              <a:lstStyle/>
+              <a:p>
+                <a:pPr marL="171450" indent="-171450">
+                  <a:spcBef>
+                    <a:spcPts val="0"/>
+                  </a:spcBef>
+                  <a:buFont typeface="Arial" panose="020B0604020202020204" pitchFamily="34" charset="0"/>
+                  <a:buChar char="•"/>
+                </a:pPr>
+                <a:r>
+                  <a:rPr lang="en-US" sz="1200" dirty="0"/>
+                  <a:t>Memory allocation comes in two varieties:</a:t>
+                </a:r>
+              </a:p>
+              <a:p>
+                <a:pPr marL="396875" lvl="1" indent="-171450">
+                  <a:spcBef>
+                    <a:spcPts val="0"/>
+                  </a:spcBef>
+                  <a:buFont typeface="Arial" panose="020B0604020202020204" pitchFamily="34" charset="0"/>
+                  <a:buChar char="•"/>
+                </a:pPr>
+                <a:r>
+                  <a:rPr lang="en-US" sz="1200" dirty="0"/>
+                  <a:t>Static (compile time): sizes and types of memory must be known at compile time</a:t>
+                </a:r>
+              </a:p>
+              <a:p>
+                <a:pPr marL="396875" lvl="1" indent="-171450">
+                  <a:spcBef>
+                    <a:spcPts val="0"/>
+                  </a:spcBef>
+                  <a:buFont typeface="Arial" panose="020B0604020202020204" pitchFamily="34" charset="0"/>
+                  <a:buChar char="•"/>
+                </a:pPr>
+                <a:r>
+                  <a:rPr lang="en-US" sz="1200" dirty="0"/>
+                  <a:t>Dynamic (run-time): memory allocated at run time, exact sizes can be variable</a:t>
+                </a:r>
+              </a:p>
+              <a:p>
+                <a:pPr marL="171450" indent="-171450">
+                  <a:spcBef>
+                    <a:spcPts val="0"/>
+                  </a:spcBef>
+                  <a:buFont typeface="Arial" panose="020B0604020202020204" pitchFamily="34" charset="0"/>
+                  <a:buChar char="•"/>
+                </a:pPr>
+                <a:r>
+                  <a:rPr lang="en-US" sz="1200" dirty="0"/>
+                  <a:t>Allocate dynamic space with operator </a:t>
+                </a:r>
+                <a14:m>
+                  <m:oMath xmlns:m="http://schemas.openxmlformats.org/officeDocument/2006/math">
+                    <m:r>
+                      <a:rPr lang="en-US" sz="1200" b="1" i="1" dirty="0" smtClean="0">
+                        <a:latin typeface="Cambria Math" panose="02040503050406030204" pitchFamily="18" charset="0"/>
+                      </a:rPr>
+                      <m:t>𝒏𝒆𝒘</m:t>
+                    </m:r>
+                  </m:oMath>
+                </a14:m>
+                <a:r>
+                  <a:rPr lang="en-US" sz="1200" dirty="0"/>
+                  <a:t>, witch returns address the of allocated item</a:t>
+                </a:r>
+              </a:p>
+              <a:p>
+                <a:pPr marL="171450" indent="-171450">
+                  <a:spcBef>
+                    <a:spcPts val="0"/>
+                  </a:spcBef>
+                  <a:buFont typeface="Arial" panose="020B0604020202020204" pitchFamily="34" charset="0"/>
+                  <a:buChar char="•"/>
+                </a:pPr>
+                <a:endParaRPr lang="en-US" sz="1200" dirty="0"/>
+              </a:p>
+              <a:p>
+                <a:pPr marL="171450" indent="-171450">
+                  <a:spcBef>
+                    <a:spcPts val="0"/>
+                  </a:spcBef>
+                  <a:buFont typeface="Arial" panose="020B0604020202020204" pitchFamily="34" charset="0"/>
+                  <a:buChar char="•"/>
+                </a:pPr>
+                <a:endParaRPr lang="en-US" sz="1200" dirty="0"/>
+              </a:p>
+              <a:p>
+                <a:pPr marL="171450" indent="-171450">
+                  <a:spcBef>
+                    <a:spcPts val="0"/>
+                  </a:spcBef>
+                  <a:buFont typeface="Arial" panose="020B0604020202020204" pitchFamily="34" charset="0"/>
+                  <a:buChar char="•"/>
+                </a:pPr>
+                <a:r>
+                  <a:rPr lang="en-US" sz="1200" dirty="0"/>
+                  <a:t>Clean up memory with operator </a:t>
+                </a:r>
+                <a14:m>
+                  <m:oMath xmlns:m="http://schemas.openxmlformats.org/officeDocument/2006/math">
+                    <m:r>
+                      <a:rPr lang="en-US" sz="1200" b="1" i="1" dirty="0" smtClean="0">
+                        <a:latin typeface="Cambria Math" panose="02040503050406030204" pitchFamily="18" charset="0"/>
+                      </a:rPr>
+                      <m:t>𝒅𝒆𝒍𝒆𝒕</m:t>
+                    </m:r>
+                    <m:r>
+                      <a:rPr lang="en-US" sz="1200" b="1" i="1" dirty="0">
+                        <a:latin typeface="Cambria Math" panose="02040503050406030204" pitchFamily="18" charset="0"/>
+                      </a:rPr>
+                      <m:t>𝒆</m:t>
+                    </m:r>
+                  </m:oMath>
+                </a14:m>
+                <a:endParaRPr lang="en-US" sz="1200" b="1" dirty="0"/>
+              </a:p>
+              <a:p>
+                <a:pPr lvl="1" indent="0">
+                  <a:spcBef>
+                    <a:spcPts val="0"/>
+                  </a:spcBef>
+                  <a:buNone/>
+                </a:pPr>
+                <a:endParaRPr lang="en-US" sz="1200" dirty="0"/>
+              </a:p>
+              <a:p>
+                <a:pPr lvl="1" indent="0">
+                  <a:spcBef>
+                    <a:spcPts val="0"/>
+                  </a:spcBef>
+                  <a:buNone/>
+                </a:pPr>
+                <a:endParaRPr lang="en-US" sz="1200" dirty="0"/>
+              </a:p>
+              <a:p>
+                <a:pPr marL="171450" indent="-171450">
+                  <a:spcBef>
+                    <a:spcPts val="0"/>
+                  </a:spcBef>
+                  <a:buFont typeface="Arial" panose="020B0604020202020204" pitchFamily="34" charset="0"/>
+                  <a:buChar char="•"/>
+                </a:pPr>
+                <a:r>
+                  <a:rPr lang="en-US" sz="1200" dirty="0"/>
+                  <a:t>Dynamic allocation of objects</a:t>
+                </a:r>
+              </a:p>
+              <a:p>
+                <a:pPr marL="396875" lvl="1" indent="-171450">
+                  <a:spcBef>
+                    <a:spcPts val="0"/>
+                  </a:spcBef>
+                  <a:buFont typeface="Arial" panose="020B0604020202020204" pitchFamily="34" charset="0"/>
+                  <a:buChar char="•"/>
+                </a:pPr>
+                <a:r>
+                  <a:rPr lang="en-US" sz="1200" dirty="0"/>
+                  <a:t>Objects can be allocated dynamically</a:t>
+                </a:r>
+              </a:p>
+              <a:p>
+                <a:pPr marL="396875" lvl="1" indent="-171450">
+                  <a:spcBef>
+                    <a:spcPts val="0"/>
+                  </a:spcBef>
+                  <a:buFont typeface="Arial" panose="020B0604020202020204" pitchFamily="34" charset="0"/>
+                  <a:buChar char="•"/>
+                </a:pPr>
+                <a:r>
+                  <a:rPr lang="en-US" sz="1200" dirty="0"/>
+                  <a:t>When an object is created, the constructor is executed</a:t>
+                </a:r>
+              </a:p>
+              <a:p>
+                <a:pPr lvl="1" indent="0">
+                  <a:spcBef>
+                    <a:spcPts val="0"/>
+                  </a:spcBef>
+                  <a:buNone/>
+                </a:pPr>
+                <a:endParaRPr lang="en-US" sz="1200" dirty="0"/>
+              </a:p>
+              <a:p>
+                <a:pPr marL="171450" indent="-171450">
+                  <a:spcBef>
+                    <a:spcPts val="0"/>
+                  </a:spcBef>
+                  <a:buFont typeface="Arial" panose="020B0604020202020204" pitchFamily="34" charset="0"/>
+                  <a:buChar char="•"/>
+                </a:pPr>
+                <a:r>
+                  <a:rPr lang="en-US" sz="1200" dirty="0"/>
+                  <a:t>Dot(.) operator vs. arrow operator</a:t>
+                </a:r>
+              </a:p>
+              <a:p>
+                <a:pPr marL="396875" lvl="1" indent="-171450">
+                  <a:spcBef>
+                    <a:spcPts val="0"/>
+                  </a:spcBef>
+                  <a:buFont typeface="Arial" panose="020B0604020202020204" pitchFamily="34" charset="0"/>
+                  <a:buChar char="•"/>
+                </a:pPr>
+                <a:r>
+                  <a:rPr lang="en-US" sz="1200" dirty="0"/>
+                  <a:t>Dot and arrow operator are both used to access the members of a class</a:t>
+                </a:r>
+              </a:p>
+              <a:p>
+                <a:pPr marL="396875" lvl="1" indent="-171450">
+                  <a:spcBef>
+                    <a:spcPts val="0"/>
+                  </a:spcBef>
+                  <a:buFont typeface="Arial" panose="020B0604020202020204" pitchFamily="34" charset="0"/>
+                  <a:buChar char="•"/>
+                </a:pPr>
+                <a:r>
+                  <a:rPr lang="en-US" sz="1200" dirty="0"/>
+                  <a:t>The dot operator is applied to the actual object</a:t>
+                </a:r>
+              </a:p>
+              <a:p>
+                <a:pPr marL="396875" lvl="1" indent="-171450">
+                  <a:spcBef>
+                    <a:spcPts val="0"/>
+                  </a:spcBef>
+                  <a:buFont typeface="Arial" panose="020B0604020202020204" pitchFamily="34" charset="0"/>
+                  <a:buChar char="•"/>
+                </a:pPr>
+                <a:r>
+                  <a:rPr lang="en-US" sz="1200" dirty="0"/>
+                  <a:t>The arrow operator is used with a pointer to an object</a:t>
+                </a:r>
+              </a:p>
+            </p:txBody>
+          </p:sp>
+        </mc:Choice>
+        <mc:Fallback>
+          <p:sp>
+            <p:nvSpPr>
+              <p:cNvPr id="4" name="Content Placeholder 3">
+                <a:extLst>
+                  <a:ext uri="{FF2B5EF4-FFF2-40B4-BE49-F238E27FC236}">
+                    <a16:creationId xmlns:a16="http://schemas.microsoft.com/office/drawing/2014/main" id="{4A82F0A8-9ABA-45A1-B114-4D9BE3C3D467}"/>
+                  </a:ext>
+                </a:extLst>
+              </p:cNvPr>
+              <p:cNvSpPr>
+                <a:spLocks noGrp="1" noRot="1" noChangeAspect="1" noMove="1" noResize="1" noEditPoints="1" noAdjustHandles="1" noChangeArrowheads="1" noChangeShapeType="1" noTextEdit="1"/>
+              </p:cNvSpPr>
+              <p:nvPr>
+                <p:ph sz="quarter" idx="13"/>
+              </p:nvPr>
+            </p:nvSpPr>
+            <p:spPr>
+              <a:xfrm>
+                <a:off x="275101" y="652910"/>
+                <a:ext cx="8228012" cy="4010826"/>
+              </a:xfrm>
+              <a:blipFill>
+                <a:blip r:embed="rId2"/>
+                <a:stretch>
+                  <a:fillRect l="-1037" t="-1216"/>
+                </a:stretch>
+              </a:blipFill>
+            </p:spPr>
+            <p:txBody>
+              <a:bodyPr/>
+              <a:lstStyle/>
+              <a:p>
+                <a:r>
+                  <a:rPr lang="en-US">
+                    <a:noFill/>
+                  </a:rPr>
+                  <a:t> </a:t>
+                </a:r>
+              </a:p>
+            </p:txBody>
+          </p:sp>
+        </mc:Fallback>
+      </mc:AlternateContent>
+      <p:pic>
+        <p:nvPicPr>
+          <p:cNvPr id="5" name="Picture 4">
+            <a:extLst>
+              <a:ext uri="{FF2B5EF4-FFF2-40B4-BE49-F238E27FC236}">
+                <a16:creationId xmlns:a16="http://schemas.microsoft.com/office/drawing/2014/main" id="{B5329AD9-C722-4218-994A-64665394FD0F}"/>
+              </a:ext>
+            </a:extLst>
+          </p:cNvPr>
+          <p:cNvPicPr>
+            <a:picLocks noChangeAspect="1"/>
+          </p:cNvPicPr>
+          <p:nvPr/>
+        </p:nvPicPr>
+        <p:blipFill>
+          <a:blip r:embed="rId3"/>
+          <a:stretch>
+            <a:fillRect/>
+          </a:stretch>
+        </p:blipFill>
+        <p:spPr>
+          <a:xfrm>
+            <a:off x="501361" y="1417637"/>
+            <a:ext cx="5314950" cy="276225"/>
+          </a:xfrm>
+          <a:prstGeom prst="rect">
+            <a:avLst/>
+          </a:prstGeom>
+        </p:spPr>
+      </p:pic>
+      <p:pic>
+        <p:nvPicPr>
+          <p:cNvPr id="7" name="Picture 6">
+            <a:extLst>
+              <a:ext uri="{FF2B5EF4-FFF2-40B4-BE49-F238E27FC236}">
+                <a16:creationId xmlns:a16="http://schemas.microsoft.com/office/drawing/2014/main" id="{A287FB93-3032-4FD2-9C1C-D2FEA10B3492}"/>
+              </a:ext>
+            </a:extLst>
+          </p:cNvPr>
+          <p:cNvPicPr>
+            <a:picLocks noChangeAspect="1"/>
+          </p:cNvPicPr>
+          <p:nvPr/>
+        </p:nvPicPr>
+        <p:blipFill>
+          <a:blip r:embed="rId4"/>
+          <a:stretch>
+            <a:fillRect/>
+          </a:stretch>
+        </p:blipFill>
+        <p:spPr>
+          <a:xfrm>
+            <a:off x="537008" y="1963016"/>
+            <a:ext cx="5705475" cy="247650"/>
+          </a:xfrm>
+          <a:prstGeom prst="rect">
+            <a:avLst/>
+          </a:prstGeom>
+        </p:spPr>
+      </p:pic>
+      <p:pic>
+        <p:nvPicPr>
+          <p:cNvPr id="10" name="Picture 9">
+            <a:extLst>
+              <a:ext uri="{FF2B5EF4-FFF2-40B4-BE49-F238E27FC236}">
+                <a16:creationId xmlns:a16="http://schemas.microsoft.com/office/drawing/2014/main" id="{1080145D-C186-47EE-81A6-C739F83D8B65}"/>
+              </a:ext>
+            </a:extLst>
+          </p:cNvPr>
+          <p:cNvPicPr>
+            <a:picLocks noChangeAspect="1"/>
+          </p:cNvPicPr>
+          <p:nvPr/>
+        </p:nvPicPr>
+        <p:blipFill>
+          <a:blip r:embed="rId5"/>
+          <a:stretch>
+            <a:fillRect/>
+          </a:stretch>
+        </p:blipFill>
+        <p:spPr>
+          <a:xfrm>
+            <a:off x="6504390" y="796074"/>
+            <a:ext cx="2501562" cy="3299997"/>
+          </a:xfrm>
+          <a:prstGeom prst="rect">
+            <a:avLst/>
+          </a:prstGeom>
+        </p:spPr>
+      </p:pic>
+    </p:spTree>
+    <p:extLst>
+      <p:ext uri="{BB962C8B-B14F-4D97-AF65-F5344CB8AC3E}">
+        <p14:creationId xmlns:p14="http://schemas.microsoft.com/office/powerpoint/2010/main" val="2461861099"/>
+      </p:ext>
+    </p:extLst>
+  </p:cSld>
+  <p:clrMapOvr>
+    <a:masterClrMapping/>
+  </p:clrMapOvr>
+  <mc:AlternateContent xmlns:mc="http://schemas.openxmlformats.org/markup-compatibility/2006" xmlns:p14="http://schemas.microsoft.com/office/powerpoint/2010/main">
+    <mc:Choice Requires="p14">
+      <p:transition spd="med" p14:dur="700">
+        <p:fade/>
+      </p:transition>
+    </mc:Choice>
+    <mc:Fallback xmlns="">
+      <p:transition spd="med">
+        <p:fade/>
+      </p:transition>
+    </mc:Fallback>
+  </mc:AlternateContent>
+</p:sld>
+</file>
+
+<file path=ppt/slides/slide13.xml><?xml version="1.0" encoding="utf-8"?>
+<p:sld xmlns:a="http://schemas.openxmlformats.org/drawingml/2006/main" xmlns:r="http://schemas.openxmlformats.org/officeDocument/2006/relationships" xmlns:p="http://schemas.openxmlformats.org/presentationml/2006/main">
+  <p:cSld>
+    <p:spTree>
+      <p:nvGrpSpPr>
+        <p:cNvPr id="1" name=""/>
+        <p:cNvGrpSpPr/>
+        <p:nvPr/>
+      </p:nvGrpSpPr>
+      <p:grpSpPr>
+        <a:xfrm>
+          <a:off x="0" y="0"/>
+          <a:ext cx="0" cy="0"/>
+          <a:chOff x="0" y="0"/>
+          <a:chExt cx="0" cy="0"/>
+        </a:xfrm>
+      </p:grpSpPr>
+      <p:sp>
+        <p:nvSpPr>
+          <p:cNvPr id="2" name="Slide Number Placeholder 1">
+            <a:extLst>
+              <a:ext uri="{FF2B5EF4-FFF2-40B4-BE49-F238E27FC236}">
+                <a16:creationId xmlns:a16="http://schemas.microsoft.com/office/drawing/2014/main" id="{8B20FB39-703A-48E0-828C-2B17F1058F82}"/>
+              </a:ext>
+            </a:extLst>
+          </p:cNvPr>
+          <p:cNvSpPr>
+            <a:spLocks noGrp="1"/>
+          </p:cNvSpPr>
+          <p:nvPr>
+            <p:ph type="sldNum" sz="quarter" idx="12"/>
+          </p:nvPr>
+        </p:nvSpPr>
+        <p:spPr/>
+        <p:txBody>
+          <a:bodyPr/>
+          <a:lstStyle/>
+          <a:p>
+            <a:fld id="{EE2556C5-CE8C-6547-B838-EA80C61A4AF7}" type="slidenum">
+              <a:rPr lang="en-US" smtClean="0"/>
+              <a:pPr/>
+              <a:t>13</a:t>
+            </a:fld>
+            <a:endParaRPr lang="en-US" dirty="0"/>
+          </a:p>
+        </p:txBody>
+      </p:sp>
+      <p:sp>
+        <p:nvSpPr>
+          <p:cNvPr id="3" name="Title 2">
+            <a:extLst>
+              <a:ext uri="{FF2B5EF4-FFF2-40B4-BE49-F238E27FC236}">
+                <a16:creationId xmlns:a16="http://schemas.microsoft.com/office/drawing/2014/main" id="{D50145E5-5498-46C8-89CD-9BD450C5FC0B}"/>
+              </a:ext>
+            </a:extLst>
+          </p:cNvPr>
+          <p:cNvSpPr>
+            <a:spLocks noGrp="1"/>
+          </p:cNvSpPr>
+          <p:nvPr>
+            <p:ph type="title"/>
+          </p:nvPr>
+        </p:nvSpPr>
+        <p:spPr>
+          <a:xfrm>
+            <a:off x="275101" y="80010"/>
+            <a:ext cx="8229600" cy="390507"/>
+          </a:xfrm>
+        </p:spPr>
+        <p:txBody>
+          <a:bodyPr/>
+          <a:lstStyle/>
+          <a:p>
+            <a:r>
+              <a:rPr lang="en-US" sz="3600" dirty="0"/>
+              <a:t>Function OVERLOADING</a:t>
+            </a:r>
+            <a:endParaRPr lang="en-US" dirty="0"/>
+          </a:p>
+        </p:txBody>
+      </p:sp>
+      <p:sp>
+        <p:nvSpPr>
+          <p:cNvPr id="4" name="Content Placeholder 3">
+            <a:extLst>
+              <a:ext uri="{FF2B5EF4-FFF2-40B4-BE49-F238E27FC236}">
+                <a16:creationId xmlns:a16="http://schemas.microsoft.com/office/drawing/2014/main" id="{4A82F0A8-9ABA-45A1-B114-4D9BE3C3D467}"/>
+              </a:ext>
+            </a:extLst>
+          </p:cNvPr>
+          <p:cNvSpPr>
+            <a:spLocks noGrp="1"/>
+          </p:cNvSpPr>
+          <p:nvPr>
+            <p:ph sz="quarter" idx="13"/>
+          </p:nvPr>
+        </p:nvSpPr>
+        <p:spPr>
+          <a:xfrm>
+            <a:off x="275101" y="652910"/>
+            <a:ext cx="8228012" cy="4010826"/>
+          </a:xfrm>
+        </p:spPr>
+        <p:txBody>
+          <a:bodyPr/>
+          <a:lstStyle/>
+          <a:p>
+            <a:pPr marL="171450" indent="-171450">
+              <a:spcBef>
+                <a:spcPts val="300"/>
+              </a:spcBef>
+              <a:buFont typeface="Arial" panose="020B0604020202020204" pitchFamily="34" charset="0"/>
+              <a:buChar char="•"/>
+            </a:pPr>
+            <a:r>
+              <a:rPr lang="en-US" sz="1200" dirty="0"/>
+              <a:t>Two or more functions can have the same name but different parameters</a:t>
+            </a:r>
+          </a:p>
+          <a:p>
+            <a:pPr marL="171450" indent="-171450">
+              <a:spcBef>
+                <a:spcPts val="300"/>
+              </a:spcBef>
+              <a:buFont typeface="Arial" panose="020B0604020202020204" pitchFamily="34" charset="0"/>
+              <a:buChar char="•"/>
+            </a:pPr>
+            <a:r>
+              <a:rPr lang="en-US" sz="1200" dirty="0"/>
+              <a:t>There are two ways to overload a function:</a:t>
+            </a:r>
+          </a:p>
+          <a:p>
+            <a:pPr marL="396875" lvl="1" indent="-171450">
+              <a:spcBef>
+                <a:spcPts val="300"/>
+              </a:spcBef>
+              <a:buFont typeface="Arial" panose="020B0604020202020204" pitchFamily="34" charset="0"/>
+              <a:buChar char="•"/>
+            </a:pPr>
+            <a:r>
+              <a:rPr lang="en-US" sz="1200" dirty="0"/>
+              <a:t>Having a different number of argument</a:t>
+            </a:r>
+          </a:p>
+          <a:p>
+            <a:pPr marL="396875" lvl="1" indent="-171450">
+              <a:spcBef>
+                <a:spcPts val="300"/>
+              </a:spcBef>
+              <a:buFont typeface="Arial" panose="020B0604020202020204" pitchFamily="34" charset="0"/>
+              <a:buChar char="•"/>
+            </a:pPr>
+            <a:r>
+              <a:rPr lang="en-US" sz="1200" dirty="0"/>
+              <a:t>Having different arguments types</a:t>
+            </a:r>
+          </a:p>
+          <a:p>
+            <a:pPr marL="396875" lvl="1" indent="-171450">
+              <a:spcBef>
+                <a:spcPts val="300"/>
+              </a:spcBef>
+              <a:buFont typeface="Arial" panose="020B0604020202020204" pitchFamily="34" charset="0"/>
+              <a:buChar char="•"/>
+            </a:pPr>
+            <a:endParaRPr lang="en-US" sz="1200" dirty="0"/>
+          </a:p>
+          <a:p>
+            <a:pPr marL="396875" lvl="1" indent="-171450">
+              <a:spcBef>
+                <a:spcPts val="300"/>
+              </a:spcBef>
+              <a:buFont typeface="Arial" panose="020B0604020202020204" pitchFamily="34" charset="0"/>
+              <a:buChar char="•"/>
+            </a:pPr>
+            <a:endParaRPr lang="en-US" sz="1200" dirty="0"/>
+          </a:p>
+          <a:p>
+            <a:pPr marL="171450" indent="-171450">
+              <a:spcBef>
+                <a:spcPts val="300"/>
+              </a:spcBef>
+              <a:buFont typeface="Arial" panose="020B0604020202020204" pitchFamily="34" charset="0"/>
+              <a:buChar char="•"/>
+            </a:pPr>
+            <a:endParaRPr lang="en-US" sz="1200" dirty="0"/>
+          </a:p>
+          <a:p>
+            <a:pPr marL="171450" indent="-171450">
+              <a:spcBef>
+                <a:spcPts val="300"/>
+              </a:spcBef>
+              <a:buFont typeface="Arial" panose="020B0604020202020204" pitchFamily="34" charset="0"/>
+              <a:buChar char="•"/>
+            </a:pPr>
+            <a:endParaRPr lang="en-US" sz="1200" dirty="0"/>
+          </a:p>
+          <a:p>
+            <a:pPr marL="171450" indent="-171450">
+              <a:spcBef>
+                <a:spcPts val="300"/>
+              </a:spcBef>
+              <a:buFont typeface="Arial" panose="020B0604020202020204" pitchFamily="34" charset="0"/>
+              <a:buChar char="•"/>
+            </a:pPr>
+            <a:endParaRPr lang="en-US" sz="1200" dirty="0"/>
+          </a:p>
+          <a:p>
+            <a:pPr marL="171450" indent="-171450">
+              <a:spcBef>
+                <a:spcPts val="300"/>
+              </a:spcBef>
+              <a:buFont typeface="Arial" panose="020B0604020202020204" pitchFamily="34" charset="0"/>
+              <a:buChar char="•"/>
+            </a:pPr>
+            <a:r>
+              <a:rPr lang="en-US" sz="1200" dirty="0"/>
+              <a:t>Instead of defining two functions that should do the same thing, it is better to overload one</a:t>
+            </a:r>
+          </a:p>
+          <a:p>
+            <a:pPr marL="171450" indent="-171450">
+              <a:spcBef>
+                <a:spcPts val="300"/>
+              </a:spcBef>
+              <a:buFont typeface="Arial" panose="020B0604020202020204" pitchFamily="34" charset="0"/>
+              <a:buChar char="•"/>
+            </a:pPr>
+            <a:r>
+              <a:rPr lang="en-US" sz="1200" dirty="0"/>
+              <a:t>Overloaded functions may or may not have different return type, but it should have different arguments</a:t>
+            </a:r>
+          </a:p>
+          <a:p>
+            <a:pPr marL="396875" lvl="1" indent="-171450">
+              <a:spcBef>
+                <a:spcPts val="300"/>
+              </a:spcBef>
+              <a:buFont typeface="Arial" panose="020B0604020202020204" pitchFamily="34" charset="0"/>
+              <a:buChar char="•"/>
+            </a:pPr>
+            <a:r>
+              <a:rPr lang="en-US" sz="1200" dirty="0"/>
+              <a:t>In the example below, even though the functions have different return types, it is not valid</a:t>
+            </a:r>
+          </a:p>
+          <a:p>
+            <a:pPr marL="396875" lvl="1" indent="-171450">
+              <a:spcBef>
+                <a:spcPts val="300"/>
+              </a:spcBef>
+              <a:buFont typeface="Arial" panose="020B0604020202020204" pitchFamily="34" charset="0"/>
+              <a:buChar char="•"/>
+            </a:pPr>
+            <a:r>
+              <a:rPr lang="en-US" sz="1200" dirty="0"/>
+              <a:t>The parameter list should be different</a:t>
+            </a:r>
+          </a:p>
+          <a:p>
+            <a:pPr marL="171450" indent="-171450">
+              <a:spcBef>
+                <a:spcPts val="300"/>
+              </a:spcBef>
+              <a:buFont typeface="Arial" panose="020B0604020202020204" pitchFamily="34" charset="0"/>
+              <a:buChar char="•"/>
+            </a:pPr>
+            <a:endParaRPr lang="en-US" sz="1200" dirty="0"/>
+          </a:p>
+        </p:txBody>
+      </p:sp>
+      <p:pic>
+        <p:nvPicPr>
+          <p:cNvPr id="7" name="Picture 6">
+            <a:extLst>
+              <a:ext uri="{FF2B5EF4-FFF2-40B4-BE49-F238E27FC236}">
+                <a16:creationId xmlns:a16="http://schemas.microsoft.com/office/drawing/2014/main" id="{A15F5742-9EA3-44C3-87A2-825657F9E53E}"/>
+              </a:ext>
+            </a:extLst>
+          </p:cNvPr>
+          <p:cNvPicPr>
+            <a:picLocks noChangeAspect="1"/>
+          </p:cNvPicPr>
+          <p:nvPr/>
+        </p:nvPicPr>
+        <p:blipFill>
+          <a:blip r:embed="rId2"/>
+          <a:stretch>
+            <a:fillRect/>
+          </a:stretch>
+        </p:blipFill>
+        <p:spPr>
+          <a:xfrm>
+            <a:off x="749732" y="1601643"/>
+            <a:ext cx="3248025" cy="933450"/>
+          </a:xfrm>
+          <a:prstGeom prst="rect">
+            <a:avLst/>
+          </a:prstGeom>
+        </p:spPr>
+      </p:pic>
+      <p:pic>
+        <p:nvPicPr>
+          <p:cNvPr id="9" name="Picture 8">
+            <a:extLst>
+              <a:ext uri="{FF2B5EF4-FFF2-40B4-BE49-F238E27FC236}">
+                <a16:creationId xmlns:a16="http://schemas.microsoft.com/office/drawing/2014/main" id="{DEB83A51-1F22-46B8-BEA0-89226C8394DC}"/>
+              </a:ext>
+            </a:extLst>
+          </p:cNvPr>
+          <p:cNvPicPr>
+            <a:picLocks noChangeAspect="1"/>
+          </p:cNvPicPr>
+          <p:nvPr/>
+        </p:nvPicPr>
+        <p:blipFill>
+          <a:blip r:embed="rId3"/>
+          <a:stretch>
+            <a:fillRect/>
+          </a:stretch>
+        </p:blipFill>
+        <p:spPr>
+          <a:xfrm>
+            <a:off x="824014" y="3545898"/>
+            <a:ext cx="2381250" cy="628650"/>
+          </a:xfrm>
+          <a:prstGeom prst="rect">
+            <a:avLst/>
+          </a:prstGeom>
+        </p:spPr>
+      </p:pic>
+    </p:spTree>
+    <p:extLst>
+      <p:ext uri="{BB962C8B-B14F-4D97-AF65-F5344CB8AC3E}">
+        <p14:creationId xmlns:p14="http://schemas.microsoft.com/office/powerpoint/2010/main" val="2108569263"/>
+      </p:ext>
+    </p:extLst>
+  </p:cSld>
+  <p:clrMapOvr>
+    <a:masterClrMapping/>
+  </p:clrMapOvr>
+  <mc:AlternateContent xmlns:mc="http://schemas.openxmlformats.org/markup-compatibility/2006" xmlns:p14="http://schemas.microsoft.com/office/powerpoint/2010/main">
+    <mc:Choice Requires="p14">
+      <p:transition spd="med" p14:dur="700">
+        <p:fade/>
+      </p:transition>
+    </mc:Choice>
+    <mc:Fallback xmlns="">
+      <p:transition spd="med">
+        <p:fade/>
+      </p:transition>
+    </mc:Fallback>
+  </mc:AlternateContent>
+</p:sld>
+</file>
+
+<file path=ppt/slides/slide14.xml><?xml version="1.0" encoding="utf-8"?>
+<p:sld xmlns:a="http://schemas.openxmlformats.org/drawingml/2006/main" xmlns:r="http://schemas.openxmlformats.org/officeDocument/2006/relationships" xmlns:p="http://schemas.openxmlformats.org/presentationml/2006/main">
+  <p:cSld>
+    <p:spTree>
+      <p:nvGrpSpPr>
+        <p:cNvPr id="1" name=""/>
+        <p:cNvGrpSpPr/>
+        <p:nvPr/>
+      </p:nvGrpSpPr>
+      <p:grpSpPr>
+        <a:xfrm>
+          <a:off x="0" y="0"/>
+          <a:ext cx="0" cy="0"/>
+          <a:chOff x="0" y="0"/>
+          <a:chExt cx="0" cy="0"/>
+        </a:xfrm>
+      </p:grpSpPr>
+      <p:sp>
+        <p:nvSpPr>
+          <p:cNvPr id="2" name="Slide Number Placeholder 1">
+            <a:extLst>
+              <a:ext uri="{FF2B5EF4-FFF2-40B4-BE49-F238E27FC236}">
+                <a16:creationId xmlns:a16="http://schemas.microsoft.com/office/drawing/2014/main" id="{8B20FB39-703A-48E0-828C-2B17F1058F82}"/>
+              </a:ext>
+            </a:extLst>
+          </p:cNvPr>
+          <p:cNvSpPr>
+            <a:spLocks noGrp="1"/>
+          </p:cNvSpPr>
+          <p:nvPr>
+            <p:ph type="sldNum" sz="quarter" idx="12"/>
+          </p:nvPr>
+        </p:nvSpPr>
+        <p:spPr/>
+        <p:txBody>
+          <a:bodyPr/>
+          <a:lstStyle/>
+          <a:p>
+            <a:fld id="{EE2556C5-CE8C-6547-B838-EA80C61A4AF7}" type="slidenum">
+              <a:rPr lang="en-US" smtClean="0"/>
+              <a:pPr/>
+              <a:t>14</a:t>
+            </a:fld>
+            <a:endParaRPr lang="en-US" dirty="0"/>
+          </a:p>
+        </p:txBody>
+      </p:sp>
+      <p:sp>
+        <p:nvSpPr>
+          <p:cNvPr id="3" name="Title 2">
+            <a:extLst>
+              <a:ext uri="{FF2B5EF4-FFF2-40B4-BE49-F238E27FC236}">
+                <a16:creationId xmlns:a16="http://schemas.microsoft.com/office/drawing/2014/main" id="{D50145E5-5498-46C8-89CD-9BD450C5FC0B}"/>
+              </a:ext>
+            </a:extLst>
+          </p:cNvPr>
+          <p:cNvSpPr>
+            <a:spLocks noGrp="1"/>
+          </p:cNvSpPr>
+          <p:nvPr>
+            <p:ph type="title"/>
+          </p:nvPr>
+        </p:nvSpPr>
+        <p:spPr>
+          <a:xfrm>
+            <a:off x="275101" y="80010"/>
+            <a:ext cx="8229600" cy="390507"/>
+          </a:xfrm>
+        </p:spPr>
+        <p:txBody>
+          <a:bodyPr/>
+          <a:lstStyle/>
+          <a:p>
+            <a:pPr>
+              <a:spcBef>
+                <a:spcPts val="600"/>
+              </a:spcBef>
+            </a:pPr>
+            <a:r>
+              <a:rPr lang="en-US" sz="3600" dirty="0"/>
+              <a:t>Default parameters</a:t>
+            </a:r>
+          </a:p>
+        </p:txBody>
+      </p:sp>
+      <p:sp>
+        <p:nvSpPr>
+          <p:cNvPr id="4" name="Content Placeholder 3">
+            <a:extLst>
+              <a:ext uri="{FF2B5EF4-FFF2-40B4-BE49-F238E27FC236}">
+                <a16:creationId xmlns:a16="http://schemas.microsoft.com/office/drawing/2014/main" id="{4A82F0A8-9ABA-45A1-B114-4D9BE3C3D467}"/>
+              </a:ext>
+            </a:extLst>
+          </p:cNvPr>
+          <p:cNvSpPr>
+            <a:spLocks noGrp="1"/>
+          </p:cNvSpPr>
+          <p:nvPr>
+            <p:ph sz="quarter" idx="13"/>
+          </p:nvPr>
+        </p:nvSpPr>
+        <p:spPr>
+          <a:xfrm>
+            <a:off x="275101" y="652910"/>
+            <a:ext cx="8228012" cy="4010826"/>
+          </a:xfrm>
+        </p:spPr>
+        <p:txBody>
+          <a:bodyPr/>
+          <a:lstStyle/>
+          <a:p>
+            <a:pPr marL="171450" indent="-171450">
+              <a:spcBef>
+                <a:spcPts val="0"/>
+              </a:spcBef>
+              <a:buFont typeface="Arial" panose="020B0604020202020204" pitchFamily="34" charset="0"/>
+              <a:buChar char="•"/>
+            </a:pPr>
+            <a:r>
+              <a:rPr lang="en-US" sz="1200" dirty="0"/>
+              <a:t>A default argument is a default value provided for a function parameter </a:t>
+            </a:r>
+          </a:p>
+          <a:p>
+            <a:pPr marL="396875" lvl="1" indent="-171450">
+              <a:spcBef>
+                <a:spcPts val="0"/>
+              </a:spcBef>
+              <a:buFont typeface="Arial" panose="020B0604020202020204" pitchFamily="34" charset="0"/>
+              <a:buChar char="•"/>
+            </a:pPr>
+            <a:r>
+              <a:rPr lang="en-US" sz="1200" dirty="0"/>
+              <a:t>If we do not supply an explicit argument, the default value will be used</a:t>
+            </a:r>
+          </a:p>
+          <a:p>
+            <a:pPr marL="396875" lvl="1" indent="-171450">
+              <a:spcBef>
+                <a:spcPts val="0"/>
+              </a:spcBef>
+              <a:buFont typeface="Arial" panose="020B0604020202020204" pitchFamily="34" charset="0"/>
+              <a:buChar char="•"/>
+            </a:pPr>
+            <a:r>
+              <a:rPr lang="en-US" sz="1200" dirty="0"/>
+              <a:t>If we do supply an argument for the parameter, the user-supplied argument is used</a:t>
+            </a:r>
+          </a:p>
+          <a:p>
+            <a:pPr marL="171450" indent="-171450">
+              <a:spcBef>
+                <a:spcPts val="0"/>
+              </a:spcBef>
+              <a:buFont typeface="Arial" panose="020B0604020202020204" pitchFamily="34" charset="0"/>
+              <a:buChar char="•"/>
+            </a:pPr>
+            <a:endParaRPr lang="en-US" sz="1200" dirty="0"/>
+          </a:p>
+          <a:p>
+            <a:pPr>
+              <a:spcBef>
+                <a:spcPts val="0"/>
+              </a:spcBef>
+            </a:pPr>
+            <a:endParaRPr lang="en-US" sz="1200" dirty="0"/>
+          </a:p>
+          <a:p>
+            <a:pPr marL="171450" indent="-171450">
+              <a:spcBef>
+                <a:spcPts val="0"/>
+              </a:spcBef>
+              <a:buFont typeface="Arial" panose="020B0604020202020204" pitchFamily="34" charset="0"/>
+              <a:buChar char="•"/>
+            </a:pPr>
+            <a:r>
+              <a:rPr lang="en-US" sz="1200" dirty="0"/>
+              <a:t>All default arguments must be for the rightmost parameters. The following is not allowed:</a:t>
+            </a:r>
+          </a:p>
+          <a:p>
+            <a:pPr marL="171450" indent="-171450">
+              <a:spcBef>
+                <a:spcPts val="0"/>
+              </a:spcBef>
+              <a:buFont typeface="Arial" panose="020B0604020202020204" pitchFamily="34" charset="0"/>
+              <a:buChar char="•"/>
+            </a:pPr>
+            <a:endParaRPr lang="en-US" sz="1200" dirty="0"/>
+          </a:p>
+          <a:p>
+            <a:pPr marL="171450" indent="-171450">
+              <a:spcBef>
+                <a:spcPts val="0"/>
+              </a:spcBef>
+              <a:buFont typeface="Arial" panose="020B0604020202020204" pitchFamily="34" charset="0"/>
+              <a:buChar char="•"/>
+            </a:pPr>
+            <a:endParaRPr lang="en-US" sz="1200" dirty="0"/>
+          </a:p>
+          <a:p>
+            <a:pPr marL="171450" indent="-171450">
+              <a:spcBef>
+                <a:spcPts val="0"/>
+              </a:spcBef>
+              <a:buFont typeface="Arial" panose="020B0604020202020204" pitchFamily="34" charset="0"/>
+              <a:buChar char="•"/>
+            </a:pPr>
+            <a:r>
+              <a:rPr lang="en-US" sz="1200" dirty="0"/>
+              <a:t>A function can have multiple default arguments</a:t>
+            </a:r>
+          </a:p>
+          <a:p>
+            <a:pPr marL="171450" indent="-171450">
+              <a:spcBef>
+                <a:spcPts val="0"/>
+              </a:spcBef>
+              <a:buFont typeface="Arial" panose="020B0604020202020204" pitchFamily="34" charset="0"/>
+              <a:buChar char="•"/>
+            </a:pPr>
+            <a:endParaRPr lang="en-US" sz="1200" dirty="0"/>
+          </a:p>
+          <a:p>
+            <a:pPr marL="171450" indent="-171450">
+              <a:spcBef>
+                <a:spcPts val="0"/>
+              </a:spcBef>
+              <a:buFont typeface="Arial" panose="020B0604020202020204" pitchFamily="34" charset="0"/>
+              <a:buChar char="•"/>
+            </a:pPr>
+            <a:endParaRPr lang="en-US" sz="1200" dirty="0"/>
+          </a:p>
+          <a:p>
+            <a:pPr marL="171450" indent="-171450">
+              <a:spcBef>
+                <a:spcPts val="0"/>
+              </a:spcBef>
+              <a:buFont typeface="Arial" panose="020B0604020202020204" pitchFamily="34" charset="0"/>
+              <a:buChar char="•"/>
+            </a:pPr>
+            <a:r>
+              <a:rPr lang="en-US" sz="1200" dirty="0"/>
+              <a:t>Functions with default arguments may be overloaded. But:</a:t>
+            </a:r>
+          </a:p>
+          <a:p>
+            <a:pPr marL="396875" lvl="1" indent="-171450">
+              <a:spcBef>
+                <a:spcPts val="0"/>
+              </a:spcBef>
+              <a:buFont typeface="Arial" panose="020B0604020202020204" pitchFamily="34" charset="0"/>
+              <a:buChar char="•"/>
+            </a:pPr>
+            <a:r>
+              <a:rPr lang="en-US" sz="1200" dirty="0"/>
+              <a:t>The default parameter do NOT count towards the parameter that make the function unique</a:t>
+            </a:r>
+          </a:p>
+          <a:p>
+            <a:pPr marL="396875" lvl="1" indent="-171450">
+              <a:spcBef>
+                <a:spcPts val="0"/>
+              </a:spcBef>
+              <a:buFont typeface="Arial" panose="020B0604020202020204" pitchFamily="34" charset="0"/>
+              <a:buChar char="•"/>
+            </a:pPr>
+            <a:r>
+              <a:rPr lang="en-US" sz="1200" dirty="0"/>
+              <a:t>The following is not allowed:</a:t>
+            </a:r>
+          </a:p>
+          <a:p>
+            <a:pPr marL="396875" lvl="1" indent="-171450">
+              <a:spcBef>
+                <a:spcPts val="0"/>
+              </a:spcBef>
+              <a:buFont typeface="Arial" panose="020B0604020202020204" pitchFamily="34" charset="0"/>
+              <a:buChar char="•"/>
+            </a:pPr>
+            <a:endParaRPr lang="en-US" sz="1200" dirty="0"/>
+          </a:p>
+          <a:p>
+            <a:pPr marL="396875" lvl="1" indent="-171450">
+              <a:spcBef>
+                <a:spcPts val="0"/>
+              </a:spcBef>
+              <a:buFont typeface="Arial" panose="020B0604020202020204" pitchFamily="34" charset="0"/>
+              <a:buChar char="•"/>
+            </a:pPr>
+            <a:endParaRPr lang="en-US" sz="1200" dirty="0"/>
+          </a:p>
+        </p:txBody>
+      </p:sp>
+      <p:pic>
+        <p:nvPicPr>
+          <p:cNvPr id="6" name="Picture 5">
+            <a:extLst>
+              <a:ext uri="{FF2B5EF4-FFF2-40B4-BE49-F238E27FC236}">
+                <a16:creationId xmlns:a16="http://schemas.microsoft.com/office/drawing/2014/main" id="{0F311BC0-D3A4-4569-8091-5054D73F6AE5}"/>
+              </a:ext>
+            </a:extLst>
+          </p:cNvPr>
+          <p:cNvPicPr>
+            <a:picLocks noChangeAspect="1"/>
+          </p:cNvPicPr>
+          <p:nvPr/>
+        </p:nvPicPr>
+        <p:blipFill>
+          <a:blip r:embed="rId2"/>
+          <a:stretch>
+            <a:fillRect/>
+          </a:stretch>
+        </p:blipFill>
+        <p:spPr>
+          <a:xfrm>
+            <a:off x="459509" y="1861403"/>
+            <a:ext cx="4448175" cy="180975"/>
+          </a:xfrm>
+          <a:prstGeom prst="rect">
+            <a:avLst/>
+          </a:prstGeom>
+        </p:spPr>
+      </p:pic>
+      <p:pic>
+        <p:nvPicPr>
+          <p:cNvPr id="9" name="Picture 8">
+            <a:extLst>
+              <a:ext uri="{FF2B5EF4-FFF2-40B4-BE49-F238E27FC236}">
+                <a16:creationId xmlns:a16="http://schemas.microsoft.com/office/drawing/2014/main" id="{6D124291-FA48-497B-BF2A-5A1520E7B6CD}"/>
+              </a:ext>
+            </a:extLst>
+          </p:cNvPr>
+          <p:cNvPicPr>
+            <a:picLocks noChangeAspect="1"/>
+          </p:cNvPicPr>
+          <p:nvPr/>
+        </p:nvPicPr>
+        <p:blipFill>
+          <a:blip r:embed="rId3"/>
+          <a:stretch>
+            <a:fillRect/>
+          </a:stretch>
+        </p:blipFill>
+        <p:spPr>
+          <a:xfrm>
+            <a:off x="459509" y="2390054"/>
+            <a:ext cx="4686300" cy="200025"/>
+          </a:xfrm>
+          <a:prstGeom prst="rect">
+            <a:avLst/>
+          </a:prstGeom>
+        </p:spPr>
+      </p:pic>
+      <p:pic>
+        <p:nvPicPr>
+          <p:cNvPr id="11" name="Picture 10">
+            <a:extLst>
+              <a:ext uri="{FF2B5EF4-FFF2-40B4-BE49-F238E27FC236}">
+                <a16:creationId xmlns:a16="http://schemas.microsoft.com/office/drawing/2014/main" id="{25C25488-3B12-49BE-A167-9BD562373515}"/>
+              </a:ext>
+            </a:extLst>
+          </p:cNvPr>
+          <p:cNvPicPr>
+            <a:picLocks noChangeAspect="1"/>
+          </p:cNvPicPr>
+          <p:nvPr/>
+        </p:nvPicPr>
+        <p:blipFill>
+          <a:blip r:embed="rId4"/>
+          <a:stretch>
+            <a:fillRect/>
+          </a:stretch>
+        </p:blipFill>
+        <p:spPr>
+          <a:xfrm>
+            <a:off x="459509" y="1323227"/>
+            <a:ext cx="5505450" cy="190500"/>
+          </a:xfrm>
+          <a:prstGeom prst="rect">
+            <a:avLst/>
+          </a:prstGeom>
+        </p:spPr>
+      </p:pic>
+      <p:pic>
+        <p:nvPicPr>
+          <p:cNvPr id="13" name="Picture 12">
+            <a:extLst>
+              <a:ext uri="{FF2B5EF4-FFF2-40B4-BE49-F238E27FC236}">
+                <a16:creationId xmlns:a16="http://schemas.microsoft.com/office/drawing/2014/main" id="{FD6FE60D-2D76-46CA-9167-47F8DEF10C09}"/>
+              </a:ext>
+            </a:extLst>
+          </p:cNvPr>
+          <p:cNvPicPr>
+            <a:picLocks noChangeAspect="1"/>
+          </p:cNvPicPr>
+          <p:nvPr/>
+        </p:nvPicPr>
+        <p:blipFill>
+          <a:blip r:embed="rId5"/>
+          <a:stretch>
+            <a:fillRect/>
+          </a:stretch>
+        </p:blipFill>
+        <p:spPr>
+          <a:xfrm>
+            <a:off x="459509" y="3249416"/>
+            <a:ext cx="3114675" cy="438150"/>
+          </a:xfrm>
+          <a:prstGeom prst="rect">
+            <a:avLst/>
+          </a:prstGeom>
+        </p:spPr>
+      </p:pic>
+    </p:spTree>
+    <p:extLst>
+      <p:ext uri="{BB962C8B-B14F-4D97-AF65-F5344CB8AC3E}">
+        <p14:creationId xmlns:p14="http://schemas.microsoft.com/office/powerpoint/2010/main" val="752086478"/>
+      </p:ext>
+    </p:extLst>
+  </p:cSld>
+  <p:clrMapOvr>
+    <a:masterClrMapping/>
+  </p:clrMapOvr>
+  <mc:AlternateContent xmlns:mc="http://schemas.openxmlformats.org/markup-compatibility/2006" xmlns:p14="http://schemas.microsoft.com/office/powerpoint/2010/main">
+    <mc:Choice Requires="p14">
+      <p:transition spd="med" p14:dur="700">
+        <p:fade/>
+      </p:transition>
+    </mc:Choice>
+    <mc:Fallback xmlns="">
+      <p:transition spd="med">
+        <p:fade/>
+      </p:transition>
+    </mc:Fallback>
+  </mc:AlternateContent>
+</p:sld>
+</file>
+
+<file path=ppt/slides/slide15.xml><?xml version="1.0" encoding="utf-8"?>
+<p:sld xmlns:a="http://schemas.openxmlformats.org/drawingml/2006/main" xmlns:r="http://schemas.openxmlformats.org/officeDocument/2006/relationships" xmlns:p="http://schemas.openxmlformats.org/presentationml/2006/main">
+  <p:cSld>
+    <p:spTree>
+      <p:nvGrpSpPr>
+        <p:cNvPr id="1" name=""/>
+        <p:cNvGrpSpPr/>
+        <p:nvPr/>
+      </p:nvGrpSpPr>
+      <p:grpSpPr>
+        <a:xfrm>
+          <a:off x="0" y="0"/>
+          <a:ext cx="0" cy="0"/>
+          <a:chOff x="0" y="0"/>
+          <a:chExt cx="0" cy="0"/>
+        </a:xfrm>
+      </p:grpSpPr>
+      <p:sp>
+        <p:nvSpPr>
+          <p:cNvPr id="2" name="Slide Number Placeholder 1">
+            <a:extLst>
+              <a:ext uri="{FF2B5EF4-FFF2-40B4-BE49-F238E27FC236}">
+                <a16:creationId xmlns:a16="http://schemas.microsoft.com/office/drawing/2014/main" id="{8B20FB39-703A-48E0-828C-2B17F1058F82}"/>
+              </a:ext>
+            </a:extLst>
+          </p:cNvPr>
+          <p:cNvSpPr>
+            <a:spLocks noGrp="1"/>
+          </p:cNvSpPr>
+          <p:nvPr>
+            <p:ph type="sldNum" sz="quarter" idx="12"/>
+          </p:nvPr>
+        </p:nvSpPr>
+        <p:spPr/>
+        <p:txBody>
+          <a:bodyPr/>
+          <a:lstStyle/>
+          <a:p>
+            <a:fld id="{EE2556C5-CE8C-6547-B838-EA80C61A4AF7}" type="slidenum">
+              <a:rPr lang="en-US" smtClean="0"/>
+              <a:pPr/>
+              <a:t>15</a:t>
+            </a:fld>
+            <a:endParaRPr lang="en-US" dirty="0"/>
+          </a:p>
+        </p:txBody>
+      </p:sp>
+      <p:sp>
+        <p:nvSpPr>
+          <p:cNvPr id="3" name="Title 2">
+            <a:extLst>
+              <a:ext uri="{FF2B5EF4-FFF2-40B4-BE49-F238E27FC236}">
+                <a16:creationId xmlns:a16="http://schemas.microsoft.com/office/drawing/2014/main" id="{D50145E5-5498-46C8-89CD-9BD450C5FC0B}"/>
+              </a:ext>
+            </a:extLst>
+          </p:cNvPr>
+          <p:cNvSpPr>
+            <a:spLocks noGrp="1"/>
+          </p:cNvSpPr>
+          <p:nvPr>
+            <p:ph type="title"/>
+          </p:nvPr>
+        </p:nvSpPr>
+        <p:spPr>
+          <a:xfrm>
+            <a:off x="275101" y="80010"/>
+            <a:ext cx="8229600" cy="390507"/>
+          </a:xfrm>
+        </p:spPr>
+        <p:txBody>
+          <a:bodyPr/>
+          <a:lstStyle/>
+          <a:p>
+            <a:pPr>
+              <a:spcBef>
+                <a:spcPts val="600"/>
+              </a:spcBef>
+            </a:pPr>
+            <a:r>
+              <a:rPr lang="en-US" sz="3600" dirty="0"/>
+              <a:t>Parameters by value\reference\pointer</a:t>
+            </a:r>
+          </a:p>
+        </p:txBody>
+      </p:sp>
+      <p:sp>
+        <p:nvSpPr>
+          <p:cNvPr id="4" name="Content Placeholder 3">
+            <a:extLst>
+              <a:ext uri="{FF2B5EF4-FFF2-40B4-BE49-F238E27FC236}">
+                <a16:creationId xmlns:a16="http://schemas.microsoft.com/office/drawing/2014/main" id="{4A82F0A8-9ABA-45A1-B114-4D9BE3C3D467}"/>
+              </a:ext>
+            </a:extLst>
+          </p:cNvPr>
+          <p:cNvSpPr>
+            <a:spLocks noGrp="1"/>
+          </p:cNvSpPr>
+          <p:nvPr>
+            <p:ph sz="quarter" idx="13"/>
+          </p:nvPr>
+        </p:nvSpPr>
+        <p:spPr>
+          <a:xfrm>
+            <a:off x="275101" y="652910"/>
+            <a:ext cx="8228012" cy="4010826"/>
+          </a:xfrm>
+        </p:spPr>
+        <p:txBody>
+          <a:bodyPr/>
+          <a:lstStyle/>
+          <a:p>
+            <a:pPr marL="171450" indent="-171450">
+              <a:spcBef>
+                <a:spcPts val="0"/>
+              </a:spcBef>
+              <a:buFont typeface="Arial" panose="020B0604020202020204" pitchFamily="34" charset="0"/>
+              <a:buChar char="•"/>
+            </a:pPr>
+            <a:r>
+              <a:rPr lang="en-US" sz="1200" dirty="0"/>
+              <a:t>A pointer variable holds the memory address of some other variable</a:t>
+            </a:r>
+          </a:p>
+          <a:p>
+            <a:pPr marL="171450" indent="-171450">
+              <a:spcBef>
+                <a:spcPts val="0"/>
+              </a:spcBef>
+              <a:buFont typeface="Arial" panose="020B0604020202020204" pitchFamily="34" charset="0"/>
+              <a:buChar char="•"/>
+            </a:pPr>
+            <a:endParaRPr lang="en-US" sz="1200" dirty="0"/>
+          </a:p>
+          <a:p>
+            <a:pPr marL="171450" indent="-171450">
+              <a:spcBef>
+                <a:spcPts val="0"/>
+              </a:spcBef>
+              <a:buFont typeface="Arial" panose="020B0604020202020204" pitchFamily="34" charset="0"/>
+              <a:buChar char="•"/>
+            </a:pPr>
+            <a:endParaRPr lang="en-US" sz="1200" dirty="0"/>
+          </a:p>
+          <a:p>
+            <a:pPr marL="171450" indent="-171450">
+              <a:spcBef>
+                <a:spcPts val="0"/>
+              </a:spcBef>
+              <a:buFont typeface="Arial" panose="020B0604020202020204" pitchFamily="34" charset="0"/>
+              <a:buChar char="•"/>
+            </a:pPr>
+            <a:endParaRPr lang="en-US" sz="1200" dirty="0"/>
+          </a:p>
+          <a:p>
+            <a:pPr marL="171450" indent="-171450">
+              <a:spcBef>
+                <a:spcPts val="0"/>
+              </a:spcBef>
+              <a:buFont typeface="Arial" panose="020B0604020202020204" pitchFamily="34" charset="0"/>
+              <a:buChar char="•"/>
+            </a:pPr>
+            <a:r>
+              <a:rPr lang="en-US" sz="1200" dirty="0"/>
+              <a:t>A reference variable “refers to” another variable</a:t>
+            </a:r>
+          </a:p>
+          <a:p>
+            <a:pPr marL="171450" indent="-171450">
+              <a:spcBef>
+                <a:spcPts val="0"/>
+              </a:spcBef>
+              <a:buFont typeface="Arial" panose="020B0604020202020204" pitchFamily="34" charset="0"/>
+              <a:buChar char="•"/>
+            </a:pPr>
+            <a:endParaRPr lang="en-US" sz="1200" dirty="0"/>
+          </a:p>
+          <a:p>
+            <a:pPr marL="171450" indent="-171450">
+              <a:spcBef>
+                <a:spcPts val="0"/>
+              </a:spcBef>
+              <a:buFont typeface="Arial" panose="020B0604020202020204" pitchFamily="34" charset="0"/>
+              <a:buChar char="•"/>
+            </a:pPr>
+            <a:endParaRPr lang="en-US" sz="1200" dirty="0"/>
+          </a:p>
+          <a:p>
+            <a:pPr marL="171450" indent="-171450">
+              <a:spcBef>
+                <a:spcPts val="0"/>
+              </a:spcBef>
+              <a:buFont typeface="Arial" panose="020B0604020202020204" pitchFamily="34" charset="0"/>
+              <a:buChar char="•"/>
+            </a:pPr>
+            <a:endParaRPr lang="en-US" sz="1200" dirty="0"/>
+          </a:p>
+          <a:p>
+            <a:pPr marL="171450" indent="-171450">
+              <a:spcBef>
+                <a:spcPts val="0"/>
+              </a:spcBef>
+              <a:buFont typeface="Arial" panose="020B0604020202020204" pitchFamily="34" charset="0"/>
+              <a:buChar char="•"/>
+            </a:pPr>
+            <a:endParaRPr lang="en-US" sz="1200" dirty="0"/>
+          </a:p>
+          <a:p>
+            <a:pPr marL="171450" indent="-171450">
+              <a:spcBef>
+                <a:spcPts val="0"/>
+              </a:spcBef>
+              <a:buFont typeface="Arial" panose="020B0604020202020204" pitchFamily="34" charset="0"/>
+              <a:buChar char="•"/>
+            </a:pPr>
+            <a:r>
+              <a:rPr lang="en-US" sz="1200" dirty="0"/>
+              <a:t>Pass by value when:</a:t>
+            </a:r>
+          </a:p>
+          <a:p>
+            <a:pPr marL="396875" lvl="1" indent="-171450">
+              <a:spcBef>
+                <a:spcPts val="0"/>
+              </a:spcBef>
+              <a:buFont typeface="Arial" panose="020B0604020202020204" pitchFamily="34" charset="0"/>
+              <a:buChar char="•"/>
+            </a:pPr>
+            <a:r>
+              <a:rPr lang="en-US" sz="1200" dirty="0"/>
+              <a:t>The function does not want to modify the parameter</a:t>
+            </a:r>
+          </a:p>
+          <a:p>
+            <a:pPr marL="396875" lvl="1" indent="-171450">
+              <a:spcBef>
+                <a:spcPts val="0"/>
+              </a:spcBef>
+              <a:buFont typeface="Arial" panose="020B0604020202020204" pitchFamily="34" charset="0"/>
+              <a:buChar char="•"/>
+            </a:pPr>
+            <a:r>
+              <a:rPr lang="en-US" sz="1200" dirty="0"/>
+              <a:t>The value is simple to copy</a:t>
+            </a:r>
+          </a:p>
+          <a:p>
+            <a:pPr marL="171450" indent="-171450">
+              <a:spcBef>
+                <a:spcPts val="0"/>
+              </a:spcBef>
+              <a:buFont typeface="Arial" panose="020B0604020202020204" pitchFamily="34" charset="0"/>
+              <a:buChar char="•"/>
+            </a:pPr>
+            <a:r>
+              <a:rPr lang="en-US" sz="1200" dirty="0"/>
+              <a:t>Pass by pointer when:</a:t>
+            </a:r>
+          </a:p>
+          <a:p>
+            <a:pPr marL="396875" lvl="1" indent="-171450">
+              <a:spcBef>
+                <a:spcPts val="0"/>
+              </a:spcBef>
+              <a:buFont typeface="Arial" panose="020B0604020202020204" pitchFamily="34" charset="0"/>
+              <a:buChar char="•"/>
+            </a:pPr>
+            <a:r>
+              <a:rPr lang="en-US" sz="1200" dirty="0"/>
+              <a:t>The value is expensive to copy</a:t>
+            </a:r>
+          </a:p>
+          <a:p>
+            <a:pPr marL="396875" lvl="1" indent="-171450">
+              <a:spcBef>
+                <a:spcPts val="0"/>
+              </a:spcBef>
+              <a:buFont typeface="Arial" panose="020B0604020202020204" pitchFamily="34" charset="0"/>
+              <a:buChar char="•"/>
+            </a:pPr>
+            <a:r>
+              <a:rPr lang="en-US" sz="1200" dirty="0"/>
+              <a:t>There is a need to modify the value</a:t>
+            </a:r>
+          </a:p>
+          <a:p>
+            <a:pPr marL="171450" indent="-171450">
+              <a:spcBef>
+                <a:spcPts val="0"/>
+              </a:spcBef>
+              <a:buFont typeface="Arial" panose="020B0604020202020204" pitchFamily="34" charset="0"/>
+              <a:buChar char="•"/>
+            </a:pPr>
+            <a:r>
+              <a:rPr lang="en-US" sz="1200" dirty="0"/>
+              <a:t>Pass by reference when:</a:t>
+            </a:r>
+          </a:p>
+          <a:p>
+            <a:pPr marL="396875" lvl="1" indent="-171450">
+              <a:spcBef>
+                <a:spcPts val="0"/>
+              </a:spcBef>
+              <a:buFont typeface="Arial" panose="020B0604020202020204" pitchFamily="34" charset="0"/>
+              <a:buChar char="•"/>
+            </a:pPr>
+            <a:r>
+              <a:rPr lang="en-US" sz="1200" dirty="0"/>
+              <a:t>The value is expensive to copy</a:t>
+            </a:r>
+          </a:p>
+          <a:p>
+            <a:pPr marL="396875" lvl="1" indent="-171450">
+              <a:spcBef>
+                <a:spcPts val="0"/>
+              </a:spcBef>
+              <a:buFont typeface="Arial" panose="020B0604020202020204" pitchFamily="34" charset="0"/>
+              <a:buChar char="•"/>
+            </a:pPr>
+            <a:r>
+              <a:rPr lang="en-US" sz="1200" dirty="0"/>
+              <a:t>The function want to modify the value referred to</a:t>
+            </a:r>
+          </a:p>
+          <a:p>
+            <a:pPr marL="396875" lvl="1" indent="-171450">
+              <a:spcBef>
+                <a:spcPts val="0"/>
+              </a:spcBef>
+              <a:buFont typeface="Arial" panose="020B0604020202020204" pitchFamily="34" charset="0"/>
+              <a:buChar char="•"/>
+            </a:pPr>
+            <a:r>
+              <a:rPr lang="en-US" sz="1200" dirty="0"/>
+              <a:t>NULL would not be a valid value if a pointer was used instead</a:t>
+            </a:r>
+          </a:p>
+        </p:txBody>
+      </p:sp>
+      <p:pic>
+        <p:nvPicPr>
+          <p:cNvPr id="6" name="Picture 5">
+            <a:extLst>
+              <a:ext uri="{FF2B5EF4-FFF2-40B4-BE49-F238E27FC236}">
+                <a16:creationId xmlns:a16="http://schemas.microsoft.com/office/drawing/2014/main" id="{831DF1D1-6992-4D75-A02F-656947EE34B8}"/>
+              </a:ext>
+            </a:extLst>
+          </p:cNvPr>
+          <p:cNvPicPr>
+            <a:picLocks noChangeAspect="1"/>
+          </p:cNvPicPr>
+          <p:nvPr/>
+        </p:nvPicPr>
+        <p:blipFill>
+          <a:blip r:embed="rId2"/>
+          <a:stretch>
+            <a:fillRect/>
+          </a:stretch>
+        </p:blipFill>
+        <p:spPr>
+          <a:xfrm>
+            <a:off x="825500" y="825066"/>
+            <a:ext cx="3124200" cy="371475"/>
+          </a:xfrm>
+          <a:prstGeom prst="rect">
+            <a:avLst/>
+          </a:prstGeom>
+        </p:spPr>
+      </p:pic>
+      <p:pic>
+        <p:nvPicPr>
+          <p:cNvPr id="8" name="Picture 7">
+            <a:extLst>
+              <a:ext uri="{FF2B5EF4-FFF2-40B4-BE49-F238E27FC236}">
+                <a16:creationId xmlns:a16="http://schemas.microsoft.com/office/drawing/2014/main" id="{A2D0A7AE-68AF-4C05-B720-620189819CE4}"/>
+              </a:ext>
+            </a:extLst>
+          </p:cNvPr>
+          <p:cNvPicPr>
+            <a:picLocks noChangeAspect="1"/>
+          </p:cNvPicPr>
+          <p:nvPr/>
+        </p:nvPicPr>
+        <p:blipFill>
+          <a:blip r:embed="rId3"/>
+          <a:stretch>
+            <a:fillRect/>
+          </a:stretch>
+        </p:blipFill>
+        <p:spPr>
+          <a:xfrm>
+            <a:off x="825500" y="1591370"/>
+            <a:ext cx="4019550" cy="495300"/>
+          </a:xfrm>
+          <a:prstGeom prst="rect">
+            <a:avLst/>
+          </a:prstGeom>
+        </p:spPr>
+      </p:pic>
+      <p:pic>
+        <p:nvPicPr>
+          <p:cNvPr id="9" name="Picture 8">
+            <a:extLst>
+              <a:ext uri="{FF2B5EF4-FFF2-40B4-BE49-F238E27FC236}">
+                <a16:creationId xmlns:a16="http://schemas.microsoft.com/office/drawing/2014/main" id="{0E34D314-6826-4516-B9A8-19CDA4763D56}"/>
+              </a:ext>
+            </a:extLst>
+          </p:cNvPr>
+          <p:cNvPicPr>
+            <a:picLocks noChangeAspect="1"/>
+          </p:cNvPicPr>
+          <p:nvPr/>
+        </p:nvPicPr>
+        <p:blipFill>
+          <a:blip r:embed="rId4"/>
+          <a:stretch>
+            <a:fillRect/>
+          </a:stretch>
+        </p:blipFill>
+        <p:spPr>
+          <a:xfrm>
+            <a:off x="5751046" y="657895"/>
+            <a:ext cx="2672515" cy="2749182"/>
+          </a:xfrm>
+          <a:prstGeom prst="rect">
+            <a:avLst/>
+          </a:prstGeom>
+        </p:spPr>
+      </p:pic>
+      <p:pic>
+        <p:nvPicPr>
+          <p:cNvPr id="10" name="Picture 9">
+            <a:extLst>
+              <a:ext uri="{FF2B5EF4-FFF2-40B4-BE49-F238E27FC236}">
+                <a16:creationId xmlns:a16="http://schemas.microsoft.com/office/drawing/2014/main" id="{5D331949-7620-4964-838A-4EBD1676B201}"/>
+              </a:ext>
+            </a:extLst>
+          </p:cNvPr>
+          <p:cNvPicPr>
+            <a:picLocks noChangeAspect="1"/>
+          </p:cNvPicPr>
+          <p:nvPr/>
+        </p:nvPicPr>
+        <p:blipFill>
+          <a:blip r:embed="rId5"/>
+          <a:stretch>
+            <a:fillRect/>
+          </a:stretch>
+        </p:blipFill>
+        <p:spPr>
+          <a:xfrm>
+            <a:off x="5929801" y="3487402"/>
+            <a:ext cx="2315007" cy="891324"/>
+          </a:xfrm>
+          <a:prstGeom prst="rect">
+            <a:avLst/>
+          </a:prstGeom>
+        </p:spPr>
+      </p:pic>
+    </p:spTree>
+    <p:extLst>
+      <p:ext uri="{BB962C8B-B14F-4D97-AF65-F5344CB8AC3E}">
+        <p14:creationId xmlns:p14="http://schemas.microsoft.com/office/powerpoint/2010/main" val="3613601506"/>
+      </p:ext>
+    </p:extLst>
+  </p:cSld>
+  <p:clrMapOvr>
+    <a:masterClrMapping/>
+  </p:clrMapOvr>
+  <mc:AlternateContent xmlns:mc="http://schemas.openxmlformats.org/markup-compatibility/2006" xmlns:p14="http://schemas.microsoft.com/office/powerpoint/2010/main">
+    <mc:Choice Requires="p14">
+      <p:transition spd="med" p14:dur="700">
+        <p:fade/>
+      </p:transition>
+    </mc:Choice>
+    <mc:Fallback xmlns="">
+      <p:transition spd="med">
+        <p:fade/>
+      </p:transition>
+    </mc:Fallback>
+  </mc:AlternateContent>
+</p:sld>
+</file>
+
+<file path=ppt/slides/slide16.xml><?xml version="1.0" encoding="utf-8"?>
+<p:sld xmlns:a="http://schemas.openxmlformats.org/drawingml/2006/main" xmlns:r="http://schemas.openxmlformats.org/officeDocument/2006/relationships" xmlns:p="http://schemas.openxmlformats.org/presentationml/2006/main">
+  <p:cSld>
+    <p:spTree>
+      <p:nvGrpSpPr>
+        <p:cNvPr id="1" name=""/>
+        <p:cNvGrpSpPr/>
+        <p:nvPr/>
+      </p:nvGrpSpPr>
+      <p:grpSpPr>
+        <a:xfrm>
+          <a:off x="0" y="0"/>
+          <a:ext cx="0" cy="0"/>
+          <a:chOff x="0" y="0"/>
+          <a:chExt cx="0" cy="0"/>
+        </a:xfrm>
+      </p:grpSpPr>
+      <p:sp>
+        <p:nvSpPr>
+          <p:cNvPr id="2" name="Slide Number Placeholder 1">
+            <a:extLst>
+              <a:ext uri="{FF2B5EF4-FFF2-40B4-BE49-F238E27FC236}">
+                <a16:creationId xmlns:a16="http://schemas.microsoft.com/office/drawing/2014/main" id="{8B20FB39-703A-48E0-828C-2B17F1058F82}"/>
+              </a:ext>
+            </a:extLst>
+          </p:cNvPr>
+          <p:cNvSpPr>
+            <a:spLocks noGrp="1"/>
+          </p:cNvSpPr>
+          <p:nvPr>
+            <p:ph type="sldNum" sz="quarter" idx="12"/>
+          </p:nvPr>
+        </p:nvSpPr>
+        <p:spPr/>
+        <p:txBody>
+          <a:bodyPr/>
+          <a:lstStyle/>
+          <a:p>
+            <a:fld id="{EE2556C5-CE8C-6547-B838-EA80C61A4AF7}" type="slidenum">
+              <a:rPr lang="en-US" smtClean="0"/>
+              <a:pPr/>
+              <a:t>16</a:t>
+            </a:fld>
+            <a:endParaRPr lang="en-US" dirty="0"/>
+          </a:p>
+        </p:txBody>
+      </p:sp>
+      <p:sp>
+        <p:nvSpPr>
+          <p:cNvPr id="3" name="Title 2">
+            <a:extLst>
+              <a:ext uri="{FF2B5EF4-FFF2-40B4-BE49-F238E27FC236}">
+                <a16:creationId xmlns:a16="http://schemas.microsoft.com/office/drawing/2014/main" id="{D50145E5-5498-46C8-89CD-9BD450C5FC0B}"/>
+              </a:ext>
+            </a:extLst>
+          </p:cNvPr>
+          <p:cNvSpPr>
+            <a:spLocks noGrp="1"/>
+          </p:cNvSpPr>
+          <p:nvPr>
+            <p:ph type="title"/>
+          </p:nvPr>
+        </p:nvSpPr>
+        <p:spPr>
+          <a:xfrm>
+            <a:off x="275101" y="80010"/>
+            <a:ext cx="8229600" cy="390507"/>
+          </a:xfrm>
+        </p:spPr>
+        <p:txBody>
+          <a:bodyPr/>
+          <a:lstStyle/>
+          <a:p>
+            <a:pPr>
+              <a:spcBef>
+                <a:spcPts val="600"/>
+              </a:spcBef>
+            </a:pPr>
+            <a:r>
+              <a:rPr lang="en-US" sz="3600" dirty="0"/>
+              <a:t>C++ Arrays</a:t>
+            </a:r>
+          </a:p>
+        </p:txBody>
+      </p:sp>
+      <mc:AlternateContent xmlns:mc="http://schemas.openxmlformats.org/markup-compatibility/2006" xmlns:a14="http://schemas.microsoft.com/office/drawing/2010/main">
+        <mc:Choice Requires="a14">
+          <p:sp>
+            <p:nvSpPr>
+              <p:cNvPr id="4" name="Content Placeholder 3">
+                <a:extLst>
+                  <a:ext uri="{FF2B5EF4-FFF2-40B4-BE49-F238E27FC236}">
+                    <a16:creationId xmlns:a16="http://schemas.microsoft.com/office/drawing/2014/main" id="{4A82F0A8-9ABA-45A1-B114-4D9BE3C3D467}"/>
+                  </a:ext>
+                </a:extLst>
+              </p:cNvPr>
+              <p:cNvSpPr>
+                <a:spLocks noGrp="1"/>
+              </p:cNvSpPr>
+              <p:nvPr>
+                <p:ph sz="quarter" idx="13"/>
+              </p:nvPr>
+            </p:nvSpPr>
+            <p:spPr>
+              <a:xfrm>
+                <a:off x="275101" y="652910"/>
+                <a:ext cx="8228012" cy="4010826"/>
+              </a:xfrm>
+            </p:spPr>
+            <p:txBody>
+              <a:bodyPr/>
+              <a:lstStyle/>
+              <a:p>
+                <a:pPr marL="171450" indent="-171450">
+                  <a:spcBef>
+                    <a:spcPts val="0"/>
+                  </a:spcBef>
+                  <a:buFont typeface="Arial" panose="020B0604020202020204" pitchFamily="34" charset="0"/>
+                  <a:buChar char="•"/>
+                </a:pPr>
+                <a:r>
+                  <a:rPr lang="en-US" sz="1200" dirty="0"/>
+                  <a:t>A series of elements of the same type placed in contagious memory locations</a:t>
+                </a:r>
+              </a:p>
+              <a:p>
+                <a:pPr marL="171450" indent="-171450">
+                  <a:spcBef>
+                    <a:spcPts val="0"/>
+                  </a:spcBef>
+                  <a:buFont typeface="Arial" panose="020B0604020202020204" pitchFamily="34" charset="0"/>
+                  <a:buChar char="•"/>
+                </a:pPr>
+                <a:r>
+                  <a:rPr lang="en-US" sz="1200" dirty="0"/>
+                  <a:t>All elements can be accessed using the same identifier, with the proper index</a:t>
+                </a:r>
+              </a:p>
+              <a:p>
+                <a:pPr>
+                  <a:spcBef>
+                    <a:spcPts val="0"/>
+                  </a:spcBef>
+                </a:pPr>
+                <a:endParaRPr lang="en-US" sz="1200" dirty="0"/>
+              </a:p>
+              <a:p>
+                <a:pPr marL="171450" indent="-171450">
+                  <a:spcBef>
+                    <a:spcPts val="0"/>
+                  </a:spcBef>
+                  <a:buFont typeface="Arial" panose="020B0604020202020204" pitchFamily="34" charset="0"/>
+                  <a:buChar char="•"/>
+                </a:pPr>
+                <a:r>
+                  <a:rPr lang="en-US" sz="1200" dirty="0"/>
+                  <a:t>To declare an array:</a:t>
+                </a:r>
+              </a:p>
+              <a:p>
+                <a:pPr marL="396875" lvl="1" indent="-171450">
+                  <a:spcBef>
+                    <a:spcPts val="0"/>
+                  </a:spcBef>
+                  <a:buFont typeface="Arial" panose="020B0604020202020204" pitchFamily="34" charset="0"/>
+                  <a:buChar char="•"/>
+                </a:pPr>
+                <a:r>
+                  <a:rPr lang="en-US" sz="1200" dirty="0"/>
+                  <a:t>Define the variable type, specify the name of the array followed by square brackets and specify the number of elements</a:t>
+                </a:r>
+              </a:p>
+              <a:p>
+                <a:pPr lvl="1" indent="0">
+                  <a:spcBef>
+                    <a:spcPts val="0"/>
+                  </a:spcBef>
+                  <a:buNone/>
+                </a:pPr>
+                <a:endParaRPr lang="en-US" sz="1200" dirty="0"/>
+              </a:p>
+              <a:p>
+                <a:pPr marL="396875" lvl="1" indent="-171450">
+                  <a:spcBef>
+                    <a:spcPts val="0"/>
+                  </a:spcBef>
+                  <a:buFont typeface="Arial" panose="020B0604020202020204" pitchFamily="34" charset="0"/>
+                  <a:buChar char="•"/>
+                </a:pPr>
+                <a:r>
+                  <a:rPr lang="en-US" sz="1200" dirty="0"/>
+                  <a:t>Elements in an array can be explicitly initialized to specific values when it is declared</a:t>
+                </a:r>
+              </a:p>
+              <a:p>
+                <a:pPr marL="396875" lvl="1" indent="-171450">
+                  <a:spcBef>
+                    <a:spcPts val="0"/>
+                  </a:spcBef>
+                  <a:buFont typeface="Arial" panose="020B0604020202020204" pitchFamily="34" charset="0"/>
+                  <a:buChar char="•"/>
+                </a:pPr>
+                <a:endParaRPr lang="en-US" sz="1200" dirty="0"/>
+              </a:p>
+              <a:p>
+                <a:pPr lvl="1" indent="0">
+                  <a:spcBef>
+                    <a:spcPts val="0"/>
+                  </a:spcBef>
+                  <a:buNone/>
+                </a:pPr>
+                <a:endParaRPr lang="en-US" sz="1200" dirty="0"/>
+              </a:p>
+              <a:p>
+                <a:pPr marL="171450" indent="-171450">
+                  <a:spcBef>
+                    <a:spcPts val="0"/>
+                  </a:spcBef>
+                  <a:buFont typeface="Arial" panose="020B0604020202020204" pitchFamily="34" charset="0"/>
+                  <a:buChar char="•"/>
+                </a:pPr>
+                <a:r>
+                  <a:rPr lang="en-US" sz="1200" dirty="0"/>
+                  <a:t>You can accesses an array element by referring the index number</a:t>
+                </a:r>
+              </a:p>
+              <a:p>
+                <a:pPr marL="396875" lvl="1" indent="-171450">
+                  <a:spcBef>
+                    <a:spcPts val="0"/>
+                  </a:spcBef>
+                  <a:buFont typeface="Arial" panose="020B0604020202020204" pitchFamily="34" charset="0"/>
+                  <a:buChar char="•"/>
+                </a:pPr>
+                <a:r>
+                  <a:rPr lang="en-US" sz="1200" dirty="0"/>
+                  <a:t>Change the third element value:</a:t>
+                </a:r>
+              </a:p>
+              <a:p>
+                <a:pPr marL="396875" lvl="1" indent="-171450">
+                  <a:spcBef>
+                    <a:spcPts val="0"/>
+                  </a:spcBef>
+                  <a:buFont typeface="Arial" panose="020B0604020202020204" pitchFamily="34" charset="0"/>
+                  <a:buChar char="•"/>
+                </a:pPr>
+                <a:endParaRPr lang="en-US" sz="1200" dirty="0"/>
+              </a:p>
+              <a:p>
+                <a:pPr marL="396875" lvl="1" indent="-171450">
+                  <a:spcBef>
+                    <a:spcPts val="0"/>
+                  </a:spcBef>
+                  <a:buFont typeface="Arial" panose="020B0604020202020204" pitchFamily="34" charset="0"/>
+                  <a:buChar char="•"/>
+                </a:pPr>
+                <a:endParaRPr lang="en-US" sz="1200" dirty="0"/>
+              </a:p>
+              <a:p>
+                <a:pPr marL="171450" indent="-171450">
+                  <a:spcBef>
+                    <a:spcPts val="0"/>
+                  </a:spcBef>
+                  <a:buFont typeface="Arial" panose="020B0604020202020204" pitchFamily="34" charset="0"/>
+                  <a:buChar char="•"/>
+                </a:pPr>
+                <a:r>
+                  <a:rPr lang="en-US" sz="1200" dirty="0"/>
+                  <a:t>Arrays and pointers:</a:t>
+                </a:r>
+              </a:p>
+              <a:p>
+                <a:pPr marL="396875" lvl="1" indent="-171450">
+                  <a:spcBef>
+                    <a:spcPts val="0"/>
+                  </a:spcBef>
+                  <a:buFont typeface="Arial" panose="020B0604020202020204" pitchFamily="34" charset="0"/>
+                  <a:buChar char="•"/>
+                </a:pPr>
+                <a:r>
+                  <a:rPr lang="en-US" sz="1200" dirty="0"/>
+                  <a:t>Pointers can store address of cells of an array</a:t>
+                </a:r>
+              </a:p>
+              <a:p>
+                <a:pPr marL="396875" lvl="1" indent="-171450">
+                  <a:spcBef>
+                    <a:spcPts val="0"/>
+                  </a:spcBef>
+                  <a:buFont typeface="Arial" panose="020B0604020202020204" pitchFamily="34" charset="0"/>
+                  <a:buChar char="•"/>
+                </a:pPr>
+                <a:r>
+                  <a:rPr lang="en-US" sz="1200" dirty="0"/>
+                  <a:t>Example: since </a:t>
+                </a:r>
+                <a14:m>
+                  <m:oMath xmlns:m="http://schemas.openxmlformats.org/officeDocument/2006/math">
+                    <m:r>
+                      <a:rPr lang="en-US" sz="1200" i="1" dirty="0" smtClean="0">
+                        <a:latin typeface="Cambria Math" panose="02040503050406030204" pitchFamily="18" charset="0"/>
+                      </a:rPr>
+                      <m:t>𝑝𝑡𝑟</m:t>
+                    </m:r>
+                  </m:oMath>
+                </a14:m>
+                <a:r>
+                  <a:rPr lang="en-US" sz="1200" dirty="0"/>
+                  <a:t> points to the third element, </a:t>
+                </a:r>
+                <a14:m>
+                  <m:oMath xmlns:m="http://schemas.openxmlformats.org/officeDocument/2006/math">
+                    <m:r>
+                      <a:rPr lang="en-US" sz="1200" i="1" dirty="0" smtClean="0">
+                        <a:latin typeface="Cambria Math" panose="02040503050406030204" pitchFamily="18" charset="0"/>
+                      </a:rPr>
+                      <m:t>𝑝𝑡𝑟</m:t>
+                    </m:r>
+                    <m:r>
+                      <a:rPr lang="en-US" sz="1200" i="1" dirty="0" smtClean="0">
+                        <a:latin typeface="Cambria Math" panose="02040503050406030204" pitchFamily="18" charset="0"/>
+                      </a:rPr>
+                      <m:t>+1</m:t>
+                    </m:r>
+                  </m:oMath>
+                </a14:m>
+                <a:r>
+                  <a:rPr lang="en-US" sz="1200" dirty="0"/>
+                  <a:t> will point to the fourth element</a:t>
+                </a:r>
+              </a:p>
+              <a:p>
+                <a:pPr marL="396875" lvl="1" indent="-171450">
+                  <a:spcBef>
+                    <a:spcPts val="0"/>
+                  </a:spcBef>
+                  <a:buFont typeface="Arial" panose="020B0604020202020204" pitchFamily="34" charset="0"/>
+                  <a:buChar char="•"/>
+                </a:pPr>
+                <a:endParaRPr lang="en-US" sz="1200" dirty="0"/>
+              </a:p>
+              <a:p>
+                <a:pPr marL="396875" lvl="1" indent="-171450">
+                  <a:spcBef>
+                    <a:spcPts val="0"/>
+                  </a:spcBef>
+                  <a:buFont typeface="Arial" panose="020B0604020202020204" pitchFamily="34" charset="0"/>
+                  <a:buChar char="•"/>
+                </a:pPr>
+                <a:endParaRPr lang="en-US" sz="1200" dirty="0"/>
+              </a:p>
+            </p:txBody>
+          </p:sp>
+        </mc:Choice>
+        <mc:Fallback xmlns="">
+          <p:sp>
+            <p:nvSpPr>
+              <p:cNvPr id="4" name="Content Placeholder 3">
+                <a:extLst>
+                  <a:ext uri="{FF2B5EF4-FFF2-40B4-BE49-F238E27FC236}">
+                    <a16:creationId xmlns:a16="http://schemas.microsoft.com/office/drawing/2014/main" id="{4A82F0A8-9ABA-45A1-B114-4D9BE3C3D467}"/>
+                  </a:ext>
+                </a:extLst>
+              </p:cNvPr>
+              <p:cNvSpPr>
+                <a:spLocks noGrp="1" noRot="1" noChangeAspect="1" noMove="1" noResize="1" noEditPoints="1" noAdjustHandles="1" noChangeArrowheads="1" noChangeShapeType="1" noTextEdit="1"/>
+              </p:cNvSpPr>
+              <p:nvPr>
+                <p:ph sz="quarter" idx="13"/>
+              </p:nvPr>
+            </p:nvSpPr>
+            <p:spPr>
+              <a:xfrm>
+                <a:off x="275101" y="652910"/>
+                <a:ext cx="8228012" cy="4010826"/>
+              </a:xfrm>
+              <a:blipFill>
+                <a:blip r:embed="rId2"/>
+                <a:stretch>
+                  <a:fillRect l="-1037" t="-1216"/>
+                </a:stretch>
+              </a:blipFill>
+            </p:spPr>
+            <p:txBody>
+              <a:bodyPr/>
+              <a:lstStyle/>
+              <a:p>
+                <a:r>
+                  <a:rPr lang="en-US">
+                    <a:noFill/>
+                  </a:rPr>
+                  <a:t> </a:t>
+                </a:r>
+              </a:p>
+            </p:txBody>
+          </p:sp>
+        </mc:Fallback>
+      </mc:AlternateContent>
+      <p:pic>
+        <p:nvPicPr>
+          <p:cNvPr id="7" name="Picture 6">
+            <a:extLst>
+              <a:ext uri="{FF2B5EF4-FFF2-40B4-BE49-F238E27FC236}">
+                <a16:creationId xmlns:a16="http://schemas.microsoft.com/office/drawing/2014/main" id="{6FAD1FA0-5218-488E-87E1-CE1C6B44BC79}"/>
+              </a:ext>
+            </a:extLst>
+          </p:cNvPr>
+          <p:cNvPicPr>
+            <a:picLocks noChangeAspect="1"/>
+          </p:cNvPicPr>
+          <p:nvPr/>
+        </p:nvPicPr>
+        <p:blipFill>
+          <a:blip r:embed="rId3"/>
+          <a:stretch>
+            <a:fillRect/>
+          </a:stretch>
+        </p:blipFill>
+        <p:spPr>
+          <a:xfrm>
+            <a:off x="6070168" y="479764"/>
+            <a:ext cx="2584305" cy="757959"/>
+          </a:xfrm>
+          <a:prstGeom prst="rect">
+            <a:avLst/>
+          </a:prstGeom>
+        </p:spPr>
+      </p:pic>
+      <p:pic>
+        <p:nvPicPr>
+          <p:cNvPr id="9" name="Picture 8">
+            <a:extLst>
+              <a:ext uri="{FF2B5EF4-FFF2-40B4-BE49-F238E27FC236}">
+                <a16:creationId xmlns:a16="http://schemas.microsoft.com/office/drawing/2014/main" id="{2C3ECDC0-48A1-4561-8892-91435BB27F30}"/>
+              </a:ext>
+            </a:extLst>
+          </p:cNvPr>
+          <p:cNvPicPr>
+            <a:picLocks noChangeAspect="1"/>
+          </p:cNvPicPr>
+          <p:nvPr/>
+        </p:nvPicPr>
+        <p:blipFill>
+          <a:blip r:embed="rId4"/>
+          <a:stretch>
+            <a:fillRect/>
+          </a:stretch>
+        </p:blipFill>
+        <p:spPr>
+          <a:xfrm>
+            <a:off x="1428027" y="1578310"/>
+            <a:ext cx="1457325" cy="333375"/>
+          </a:xfrm>
+          <a:prstGeom prst="rect">
+            <a:avLst/>
+          </a:prstGeom>
+        </p:spPr>
+      </p:pic>
+      <p:pic>
+        <p:nvPicPr>
+          <p:cNvPr id="10" name="Picture 9">
+            <a:extLst>
+              <a:ext uri="{FF2B5EF4-FFF2-40B4-BE49-F238E27FC236}">
+                <a16:creationId xmlns:a16="http://schemas.microsoft.com/office/drawing/2014/main" id="{2FE7718C-BA8E-44C8-909E-DC5C9CDC5B55}"/>
+              </a:ext>
+            </a:extLst>
+          </p:cNvPr>
+          <p:cNvPicPr>
+            <a:picLocks noChangeAspect="1"/>
+          </p:cNvPicPr>
+          <p:nvPr/>
+        </p:nvPicPr>
+        <p:blipFill>
+          <a:blip r:embed="rId5"/>
+          <a:stretch>
+            <a:fillRect/>
+          </a:stretch>
+        </p:blipFill>
+        <p:spPr>
+          <a:xfrm>
+            <a:off x="1621992" y="2137563"/>
+            <a:ext cx="3286125" cy="333375"/>
+          </a:xfrm>
+          <a:prstGeom prst="rect">
+            <a:avLst/>
+          </a:prstGeom>
+        </p:spPr>
+      </p:pic>
+      <p:pic>
+        <p:nvPicPr>
+          <p:cNvPr id="11" name="Picture 10">
+            <a:extLst>
+              <a:ext uri="{FF2B5EF4-FFF2-40B4-BE49-F238E27FC236}">
+                <a16:creationId xmlns:a16="http://schemas.microsoft.com/office/drawing/2014/main" id="{7F2EB7F1-F15E-4D4B-9538-F27D37A047D7}"/>
+              </a:ext>
+            </a:extLst>
+          </p:cNvPr>
+          <p:cNvPicPr>
+            <a:picLocks noChangeAspect="1"/>
+          </p:cNvPicPr>
+          <p:nvPr/>
+        </p:nvPicPr>
+        <p:blipFill>
+          <a:blip r:embed="rId6"/>
+          <a:stretch>
+            <a:fillRect/>
+          </a:stretch>
+        </p:blipFill>
+        <p:spPr>
+          <a:xfrm>
+            <a:off x="1621992" y="2833812"/>
+            <a:ext cx="1295400" cy="342900"/>
+          </a:xfrm>
+          <a:prstGeom prst="rect">
+            <a:avLst/>
+          </a:prstGeom>
+        </p:spPr>
+      </p:pic>
+      <p:pic>
+        <p:nvPicPr>
+          <p:cNvPr id="12" name="Picture 11">
+            <a:extLst>
+              <a:ext uri="{FF2B5EF4-FFF2-40B4-BE49-F238E27FC236}">
+                <a16:creationId xmlns:a16="http://schemas.microsoft.com/office/drawing/2014/main" id="{B4A0998F-226D-426A-92D9-9034F7D6C001}"/>
+              </a:ext>
+            </a:extLst>
+          </p:cNvPr>
+          <p:cNvPicPr>
+            <a:picLocks noChangeAspect="1"/>
+          </p:cNvPicPr>
+          <p:nvPr/>
+        </p:nvPicPr>
+        <p:blipFill>
+          <a:blip r:embed="rId7"/>
+          <a:stretch>
+            <a:fillRect/>
+          </a:stretch>
+        </p:blipFill>
+        <p:spPr>
+          <a:xfrm>
+            <a:off x="631650" y="3878737"/>
+            <a:ext cx="6188365" cy="576883"/>
+          </a:xfrm>
+          <a:prstGeom prst="rect">
+            <a:avLst/>
+          </a:prstGeom>
+        </p:spPr>
+      </p:pic>
+    </p:spTree>
+    <p:extLst>
+      <p:ext uri="{BB962C8B-B14F-4D97-AF65-F5344CB8AC3E}">
+        <p14:creationId xmlns:p14="http://schemas.microsoft.com/office/powerpoint/2010/main" val="3096937686"/>
+      </p:ext>
+    </p:extLst>
+  </p:cSld>
+  <p:clrMapOvr>
+    <a:masterClrMapping/>
+  </p:clrMapOvr>
+  <mc:AlternateContent xmlns:mc="http://schemas.openxmlformats.org/markup-compatibility/2006" xmlns:p14="http://schemas.microsoft.com/office/powerpoint/2010/main">
+    <mc:Choice Requires="p14">
+      <p:transition spd="med" p14:dur="700">
+        <p:fade/>
+      </p:transition>
+    </mc:Choice>
+    <mc:Fallback xmlns="">
+      <p:transition spd="med">
+        <p:fade/>
+      </p:transition>
+    </mc:Fallback>
+  </mc:AlternateContent>
+</p:sld>
+</file>
+
+<file path=ppt/slides/slide17.xml><?xml version="1.0" encoding="utf-8"?>
+<p:sld xmlns:a="http://schemas.openxmlformats.org/drawingml/2006/main" xmlns:r="http://schemas.openxmlformats.org/officeDocument/2006/relationships" xmlns:p="http://schemas.openxmlformats.org/presentationml/2006/main">
+  <p:cSld>
+    <p:spTree>
+      <p:nvGrpSpPr>
+        <p:cNvPr id="1" name=""/>
+        <p:cNvGrpSpPr/>
+        <p:nvPr/>
+      </p:nvGrpSpPr>
+      <p:grpSpPr>
+        <a:xfrm>
+          <a:off x="0" y="0"/>
+          <a:ext cx="0" cy="0"/>
+          <a:chOff x="0" y="0"/>
+          <a:chExt cx="0" cy="0"/>
+        </a:xfrm>
+      </p:grpSpPr>
+      <p:sp>
+        <p:nvSpPr>
+          <p:cNvPr id="2" name="Slide Number Placeholder 1">
+            <a:extLst>
+              <a:ext uri="{FF2B5EF4-FFF2-40B4-BE49-F238E27FC236}">
+                <a16:creationId xmlns:a16="http://schemas.microsoft.com/office/drawing/2014/main" id="{8B20FB39-703A-48E0-828C-2B17F1058F82}"/>
+              </a:ext>
+            </a:extLst>
+          </p:cNvPr>
+          <p:cNvSpPr>
+            <a:spLocks noGrp="1"/>
+          </p:cNvSpPr>
+          <p:nvPr>
+            <p:ph type="sldNum" sz="quarter" idx="12"/>
+          </p:nvPr>
+        </p:nvSpPr>
+        <p:spPr/>
+        <p:txBody>
+          <a:bodyPr/>
+          <a:lstStyle/>
+          <a:p>
+            <a:fld id="{EE2556C5-CE8C-6547-B838-EA80C61A4AF7}" type="slidenum">
+              <a:rPr lang="en-US" smtClean="0"/>
+              <a:pPr/>
+              <a:t>17</a:t>
+            </a:fld>
+            <a:endParaRPr lang="en-US" dirty="0"/>
+          </a:p>
+        </p:txBody>
+      </p:sp>
+      <p:sp>
+        <p:nvSpPr>
+          <p:cNvPr id="3" name="Title 2">
+            <a:extLst>
+              <a:ext uri="{FF2B5EF4-FFF2-40B4-BE49-F238E27FC236}">
+                <a16:creationId xmlns:a16="http://schemas.microsoft.com/office/drawing/2014/main" id="{D50145E5-5498-46C8-89CD-9BD450C5FC0B}"/>
+              </a:ext>
+            </a:extLst>
+          </p:cNvPr>
+          <p:cNvSpPr>
+            <a:spLocks noGrp="1"/>
+          </p:cNvSpPr>
+          <p:nvPr>
+            <p:ph type="title"/>
+          </p:nvPr>
+        </p:nvSpPr>
+        <p:spPr>
+          <a:xfrm>
+            <a:off x="275101" y="80010"/>
+            <a:ext cx="8229600" cy="390507"/>
+          </a:xfrm>
+        </p:spPr>
+        <p:txBody>
+          <a:bodyPr/>
+          <a:lstStyle/>
+          <a:p>
+            <a:pPr>
+              <a:spcBef>
+                <a:spcPts val="600"/>
+              </a:spcBef>
+            </a:pPr>
+            <a:r>
+              <a:rPr lang="en-US" sz="3600" dirty="0"/>
+              <a:t>CASTING</a:t>
+            </a:r>
+          </a:p>
+        </p:txBody>
+      </p:sp>
+      <p:sp>
+        <p:nvSpPr>
+          <p:cNvPr id="4" name="Content Placeholder 3">
+            <a:extLst>
+              <a:ext uri="{FF2B5EF4-FFF2-40B4-BE49-F238E27FC236}">
+                <a16:creationId xmlns:a16="http://schemas.microsoft.com/office/drawing/2014/main" id="{4A82F0A8-9ABA-45A1-B114-4D9BE3C3D467}"/>
+              </a:ext>
+            </a:extLst>
+          </p:cNvPr>
+          <p:cNvSpPr>
+            <a:spLocks noGrp="1"/>
+          </p:cNvSpPr>
+          <p:nvPr>
+            <p:ph sz="quarter" idx="13"/>
+          </p:nvPr>
+        </p:nvSpPr>
+        <p:spPr>
+          <a:xfrm>
+            <a:off x="275101" y="652910"/>
+            <a:ext cx="8228012" cy="4010826"/>
+          </a:xfrm>
+        </p:spPr>
+        <p:txBody>
+          <a:bodyPr/>
+          <a:lstStyle/>
+          <a:p>
+            <a:pPr marL="171450" indent="-171450">
+              <a:spcBef>
+                <a:spcPts val="0"/>
+              </a:spcBef>
+              <a:buFont typeface="Arial" panose="020B0604020202020204" pitchFamily="34" charset="0"/>
+              <a:buChar char="•"/>
+            </a:pPr>
+            <a:r>
+              <a:rPr lang="en-US" sz="1200" dirty="0"/>
+              <a:t>A cast is a special operator that forces one data type to be converted into another</a:t>
+            </a:r>
+          </a:p>
+          <a:p>
+            <a:pPr marL="171450" indent="-171450">
+              <a:spcBef>
+                <a:spcPts val="0"/>
+              </a:spcBef>
+              <a:buFont typeface="Arial" panose="020B0604020202020204" pitchFamily="34" charset="0"/>
+              <a:buChar char="•"/>
+            </a:pPr>
+            <a:endParaRPr lang="en-US" sz="1200" dirty="0"/>
+          </a:p>
+          <a:p>
+            <a:pPr marL="171450" indent="-171450">
+              <a:spcBef>
+                <a:spcPts val="0"/>
+              </a:spcBef>
+              <a:buFont typeface="Arial" panose="020B0604020202020204" pitchFamily="34" charset="0"/>
+              <a:buChar char="•"/>
+            </a:pPr>
+            <a:endParaRPr lang="en-US" sz="1200" dirty="0"/>
+          </a:p>
+          <a:p>
+            <a:pPr marL="171450" indent="-171450">
+              <a:spcBef>
+                <a:spcPts val="0"/>
+              </a:spcBef>
+              <a:buFont typeface="Arial" panose="020B0604020202020204" pitchFamily="34" charset="0"/>
+              <a:buChar char="•"/>
+            </a:pPr>
+            <a:endParaRPr lang="en-US" sz="1200" dirty="0"/>
+          </a:p>
+          <a:p>
+            <a:pPr marL="171450" indent="-171450">
+              <a:spcBef>
+                <a:spcPts val="0"/>
+              </a:spcBef>
+              <a:buFont typeface="Arial" panose="020B0604020202020204" pitchFamily="34" charset="0"/>
+              <a:buChar char="•"/>
+            </a:pPr>
+            <a:endParaRPr lang="en-US" sz="1200" dirty="0"/>
+          </a:p>
+          <a:p>
+            <a:pPr marL="171450" indent="-171450">
+              <a:spcBef>
+                <a:spcPts val="0"/>
+              </a:spcBef>
+              <a:buFont typeface="Arial" panose="020B0604020202020204" pitchFamily="34" charset="0"/>
+              <a:buChar char="•"/>
+            </a:pPr>
+            <a:endParaRPr lang="en-US" sz="1200" dirty="0"/>
+          </a:p>
+          <a:p>
+            <a:pPr marL="171450" indent="-171450">
+              <a:spcBef>
+                <a:spcPts val="0"/>
+              </a:spcBef>
+              <a:buFont typeface="Arial" panose="020B0604020202020204" pitchFamily="34" charset="0"/>
+              <a:buChar char="•"/>
+            </a:pPr>
+            <a:r>
+              <a:rPr lang="en-US" sz="1200" dirty="0"/>
+              <a:t>Other casting operators supported by C++</a:t>
+            </a:r>
+          </a:p>
+          <a:p>
+            <a:pPr marL="396875" lvl="1" indent="-171450">
+              <a:spcBef>
+                <a:spcPts val="0"/>
+              </a:spcBef>
+              <a:buFont typeface="Arial" panose="020B0604020202020204" pitchFamily="34" charset="0"/>
+              <a:buChar char="•"/>
+            </a:pPr>
+            <a:r>
+              <a:rPr lang="en-US" sz="1200" dirty="0" err="1"/>
+              <a:t>dynamic_cast</a:t>
+            </a:r>
+            <a:r>
+              <a:rPr lang="en-US" sz="1200" dirty="0"/>
+              <a:t>: a run-time cast, performs casts on polymorphic types</a:t>
+            </a:r>
+          </a:p>
+          <a:p>
+            <a:pPr marL="396875" lvl="1" indent="-171450">
+              <a:spcBef>
+                <a:spcPts val="0"/>
+              </a:spcBef>
+              <a:buFont typeface="Arial" panose="020B0604020202020204" pitchFamily="34" charset="0"/>
+              <a:buChar char="•"/>
+            </a:pPr>
+            <a:r>
+              <a:rPr lang="en-US" sz="1200" dirty="0" err="1"/>
+              <a:t>static_cast</a:t>
+            </a:r>
+            <a:r>
+              <a:rPr lang="en-US" sz="1200" dirty="0"/>
+              <a:t>: performs a nonpolymorphic cast, it can be used to cast a base class pointer into a derived class pointer</a:t>
+            </a:r>
+          </a:p>
+          <a:p>
+            <a:pPr marL="396875" lvl="1" indent="-171450">
+              <a:spcBef>
+                <a:spcPts val="0"/>
+              </a:spcBef>
+              <a:buFont typeface="Arial" panose="020B0604020202020204" pitchFamily="34" charset="0"/>
+              <a:buChar char="•"/>
+            </a:pPr>
+            <a:r>
+              <a:rPr lang="en-US" sz="1200" dirty="0" err="1"/>
+              <a:t>reinterpret_cast</a:t>
+            </a:r>
+            <a:r>
+              <a:rPr lang="en-US" sz="1200" dirty="0"/>
+              <a:t>: changes a pointer to any other type of pointer</a:t>
+            </a:r>
+          </a:p>
+          <a:p>
+            <a:pPr marL="396875" lvl="1" indent="-171450">
+              <a:spcBef>
+                <a:spcPts val="0"/>
+              </a:spcBef>
+              <a:buFont typeface="Arial" panose="020B0604020202020204" pitchFamily="34" charset="0"/>
+              <a:buChar char="•"/>
+            </a:pPr>
+            <a:r>
+              <a:rPr lang="en-US" sz="1200" dirty="0" err="1"/>
+              <a:t>static_cast</a:t>
+            </a:r>
+            <a:r>
+              <a:rPr lang="en-US" sz="1200" dirty="0"/>
+              <a:t>: used explicitly to override const and/or volatile in a cast</a:t>
+            </a:r>
+          </a:p>
+          <a:p>
+            <a:pPr marL="396875" lvl="1" indent="-171450">
+              <a:spcBef>
+                <a:spcPts val="0"/>
+              </a:spcBef>
+              <a:buFont typeface="Arial" panose="020B0604020202020204" pitchFamily="34" charset="0"/>
+              <a:buChar char="•"/>
+            </a:pPr>
+            <a:endParaRPr lang="en-US" sz="1200" dirty="0"/>
+          </a:p>
+          <a:p>
+            <a:pPr marL="396875" lvl="1" indent="-171450">
+              <a:spcBef>
+                <a:spcPts val="0"/>
+              </a:spcBef>
+              <a:buFont typeface="Arial" panose="020B0604020202020204" pitchFamily="34" charset="0"/>
+              <a:buChar char="•"/>
+            </a:pPr>
+            <a:endParaRPr lang="en-US" sz="1200" dirty="0"/>
+          </a:p>
+          <a:p>
+            <a:pPr marL="396875" lvl="1" indent="-171450">
+              <a:spcBef>
+                <a:spcPts val="0"/>
+              </a:spcBef>
+              <a:buFont typeface="Arial" panose="020B0604020202020204" pitchFamily="34" charset="0"/>
+              <a:buChar char="•"/>
+            </a:pPr>
+            <a:endParaRPr lang="en-US" sz="1200" dirty="0"/>
+          </a:p>
+        </p:txBody>
+      </p:sp>
+      <p:pic>
+        <p:nvPicPr>
+          <p:cNvPr id="6" name="Picture 5">
+            <a:extLst>
+              <a:ext uri="{FF2B5EF4-FFF2-40B4-BE49-F238E27FC236}">
+                <a16:creationId xmlns:a16="http://schemas.microsoft.com/office/drawing/2014/main" id="{8BE00F7D-40F3-4FAE-9625-CDAFEC28522C}"/>
+              </a:ext>
+            </a:extLst>
+          </p:cNvPr>
+          <p:cNvPicPr>
+            <a:picLocks noChangeAspect="1"/>
+          </p:cNvPicPr>
+          <p:nvPr/>
+        </p:nvPicPr>
+        <p:blipFill>
+          <a:blip r:embed="rId2"/>
+          <a:stretch>
+            <a:fillRect/>
+          </a:stretch>
+        </p:blipFill>
+        <p:spPr>
+          <a:xfrm>
+            <a:off x="721446" y="940232"/>
+            <a:ext cx="3286125" cy="695325"/>
+          </a:xfrm>
+          <a:prstGeom prst="rect">
+            <a:avLst/>
+          </a:prstGeom>
+        </p:spPr>
+      </p:pic>
+    </p:spTree>
+    <p:extLst>
+      <p:ext uri="{BB962C8B-B14F-4D97-AF65-F5344CB8AC3E}">
+        <p14:creationId xmlns:p14="http://schemas.microsoft.com/office/powerpoint/2010/main" val="4118595208"/>
+      </p:ext>
+    </p:extLst>
+  </p:cSld>
+  <p:clrMapOvr>
+    <a:masterClrMapping/>
+  </p:clrMapOvr>
+  <mc:AlternateContent xmlns:mc="http://schemas.openxmlformats.org/markup-compatibility/2006" xmlns:p14="http://schemas.microsoft.com/office/powerpoint/2010/main">
+    <mc:Choice Requires="p14">
+      <p:transition spd="med" p14:dur="700">
+        <p:fade/>
+      </p:transition>
+    </mc:Choice>
+    <mc:Fallback xmlns="">
+      <p:transition spd="med">
+        <p:fade/>
+      </p:transition>
+    </mc:Fallback>
+  </mc:AlternateContent>
+</p:sld>
+</file>
+
+<file path=ppt/slides/slide18.xml><?xml version="1.0" encoding="utf-8"?>
+<p:sld xmlns:a="http://schemas.openxmlformats.org/drawingml/2006/main" xmlns:r="http://schemas.openxmlformats.org/officeDocument/2006/relationships" xmlns:p="http://schemas.openxmlformats.org/presentationml/2006/main">
+  <p:cSld>
+    <p:spTree>
+      <p:nvGrpSpPr>
+        <p:cNvPr id="1" name=""/>
+        <p:cNvGrpSpPr/>
+        <p:nvPr/>
+      </p:nvGrpSpPr>
+      <p:grpSpPr>
+        <a:xfrm>
+          <a:off x="0" y="0"/>
+          <a:ext cx="0" cy="0"/>
+          <a:chOff x="0" y="0"/>
+          <a:chExt cx="0" cy="0"/>
+        </a:xfrm>
+      </p:grpSpPr>
+      <p:sp>
+        <p:nvSpPr>
+          <p:cNvPr id="2" name="Slide Number Placeholder 1">
+            <a:extLst>
+              <a:ext uri="{FF2B5EF4-FFF2-40B4-BE49-F238E27FC236}">
+                <a16:creationId xmlns:a16="http://schemas.microsoft.com/office/drawing/2014/main" id="{8B20FB39-703A-48E0-828C-2B17F1058F82}"/>
+              </a:ext>
+            </a:extLst>
+          </p:cNvPr>
+          <p:cNvSpPr>
+            <a:spLocks noGrp="1"/>
+          </p:cNvSpPr>
+          <p:nvPr>
+            <p:ph type="sldNum" sz="quarter" idx="12"/>
+          </p:nvPr>
+        </p:nvSpPr>
+        <p:spPr/>
+        <p:txBody>
+          <a:bodyPr/>
+          <a:lstStyle/>
+          <a:p>
+            <a:fld id="{EE2556C5-CE8C-6547-B838-EA80C61A4AF7}" type="slidenum">
+              <a:rPr lang="en-US" smtClean="0"/>
+              <a:pPr/>
+              <a:t>18</a:t>
+            </a:fld>
+            <a:endParaRPr lang="en-US" dirty="0"/>
+          </a:p>
+        </p:txBody>
+      </p:sp>
+      <p:sp>
+        <p:nvSpPr>
+          <p:cNvPr id="3" name="Title 2">
+            <a:extLst>
+              <a:ext uri="{FF2B5EF4-FFF2-40B4-BE49-F238E27FC236}">
+                <a16:creationId xmlns:a16="http://schemas.microsoft.com/office/drawing/2014/main" id="{D50145E5-5498-46C8-89CD-9BD450C5FC0B}"/>
+              </a:ext>
+            </a:extLst>
+          </p:cNvPr>
+          <p:cNvSpPr>
+            <a:spLocks noGrp="1"/>
+          </p:cNvSpPr>
+          <p:nvPr>
+            <p:ph type="title"/>
+          </p:nvPr>
+        </p:nvSpPr>
+        <p:spPr>
+          <a:xfrm>
+            <a:off x="275101" y="80010"/>
+            <a:ext cx="8229600" cy="390507"/>
+          </a:xfrm>
+        </p:spPr>
+        <p:txBody>
+          <a:bodyPr/>
+          <a:lstStyle/>
+          <a:p>
+            <a:pPr>
+              <a:spcBef>
+                <a:spcPts val="600"/>
+              </a:spcBef>
+            </a:pPr>
+            <a:r>
+              <a:rPr lang="en-US" sz="3600" dirty="0"/>
+              <a:t>EXTERN</a:t>
+            </a:r>
+          </a:p>
+        </p:txBody>
+      </p:sp>
+      <mc:AlternateContent xmlns:mc="http://schemas.openxmlformats.org/markup-compatibility/2006" xmlns:a14="http://schemas.microsoft.com/office/drawing/2010/main">
+        <mc:Choice Requires="a14">
+          <p:sp>
+            <p:nvSpPr>
+              <p:cNvPr id="4" name="Content Placeholder 3">
+                <a:extLst>
+                  <a:ext uri="{FF2B5EF4-FFF2-40B4-BE49-F238E27FC236}">
+                    <a16:creationId xmlns:a16="http://schemas.microsoft.com/office/drawing/2014/main" id="{4A82F0A8-9ABA-45A1-B114-4D9BE3C3D467}"/>
+                  </a:ext>
+                </a:extLst>
+              </p:cNvPr>
+              <p:cNvSpPr>
+                <a:spLocks noGrp="1"/>
+              </p:cNvSpPr>
+              <p:nvPr>
+                <p:ph sz="quarter" idx="13"/>
+              </p:nvPr>
+            </p:nvSpPr>
+            <p:spPr>
+              <a:xfrm>
+                <a:off x="275101" y="652910"/>
+                <a:ext cx="8228012" cy="4010826"/>
+              </a:xfrm>
+            </p:spPr>
+            <p:txBody>
+              <a:bodyPr/>
+              <a:lstStyle/>
+              <a:p>
+                <a:pPr marL="171450" indent="-171450">
+                  <a:spcBef>
+                    <a:spcPts val="0"/>
+                  </a:spcBef>
+                  <a:buFont typeface="Arial" panose="020B0604020202020204" pitchFamily="34" charset="0"/>
+                  <a:buChar char="•"/>
+                </a:pPr>
+                <a:r>
+                  <a:rPr lang="en-US" sz="1200" dirty="0"/>
+                  <a:t>Comes from the C language </a:t>
+                </a:r>
+              </a:p>
+              <a:p>
+                <a:pPr marL="171450" indent="-171450">
+                  <a:spcBef>
+                    <a:spcPts val="0"/>
+                  </a:spcBef>
+                  <a:buFont typeface="Arial" panose="020B0604020202020204" pitchFamily="34" charset="0"/>
+                  <a:buChar char="•"/>
+                </a:pPr>
+                <a:r>
+                  <a:rPr lang="en-US" sz="1200" dirty="0"/>
+                  <a:t>Extends the visibility of variables/functions</a:t>
+                </a:r>
+              </a:p>
+              <a:p>
+                <a:pPr marL="171450" indent="-171450">
+                  <a:spcBef>
+                    <a:spcPts val="0"/>
+                  </a:spcBef>
+                  <a:buFont typeface="Arial" panose="020B0604020202020204" pitchFamily="34" charset="0"/>
+                  <a:buChar char="•"/>
+                </a:pPr>
+                <a:r>
+                  <a:rPr lang="en-US" sz="1200" dirty="0"/>
+                  <a:t>Tells the compiler that a variable is declared in another source module (outside of the current scope)</a:t>
+                </a:r>
+              </a:p>
+              <a:p>
+                <a:pPr marL="171450" indent="-171450">
+                  <a:spcBef>
+                    <a:spcPts val="0"/>
+                  </a:spcBef>
+                  <a:buFont typeface="Arial" panose="020B0604020202020204" pitchFamily="34" charset="0"/>
+                  <a:buChar char="•"/>
+                </a:pPr>
+                <a:r>
+                  <a:rPr lang="en-US" sz="1200" dirty="0"/>
+                  <a:t>Example:</a:t>
+                </a:r>
+              </a:p>
+              <a:p>
+                <a:pPr marL="396875" lvl="1" indent="-171450">
+                  <a:spcBef>
+                    <a:spcPts val="0"/>
+                  </a:spcBef>
+                  <a:buFont typeface="Arial" panose="020B0604020202020204" pitchFamily="34" charset="0"/>
+                  <a:buChar char="•"/>
+                </a:pPr>
+                <a:endParaRPr lang="en-US" sz="1200" dirty="0"/>
+              </a:p>
+              <a:p>
+                <a:pPr marL="396875" lvl="1" indent="-171450">
+                  <a:spcBef>
+                    <a:spcPts val="0"/>
+                  </a:spcBef>
+                  <a:buFont typeface="Arial" panose="020B0604020202020204" pitchFamily="34" charset="0"/>
+                  <a:buChar char="•"/>
+                </a:pPr>
+                <a:r>
+                  <a:rPr lang="en-US" sz="1200" dirty="0"/>
+                  <a:t>Declares that there is a variable named</a:t>
+                </a:r>
+                <a14:m>
+                  <m:oMath xmlns:m="http://schemas.openxmlformats.org/officeDocument/2006/math">
+                    <m:r>
+                      <a:rPr lang="en-US" sz="1200" i="1" dirty="0" smtClean="0">
+                        <a:latin typeface="Cambria Math" panose="02040503050406030204" pitchFamily="18" charset="0"/>
+                      </a:rPr>
+                      <m:t> </m:t>
+                    </m:r>
+                    <m:r>
+                      <a:rPr lang="en-US" sz="1200" i="1" dirty="0" smtClean="0">
+                        <a:latin typeface="Cambria Math" panose="02040503050406030204" pitchFamily="18" charset="0"/>
+                      </a:rPr>
+                      <m:t>𝑖</m:t>
+                    </m:r>
+                    <m:r>
+                      <a:rPr lang="en-US" sz="1200" i="1" dirty="0">
+                        <a:latin typeface="Cambria Math" panose="02040503050406030204" pitchFamily="18" charset="0"/>
+                      </a:rPr>
+                      <m:t> </m:t>
+                    </m:r>
+                  </m:oMath>
+                </a14:m>
+                <a:r>
+                  <a:rPr lang="en-US" sz="1200" dirty="0"/>
+                  <a:t>of type int, defined somewhere in the program</a:t>
+                </a:r>
+              </a:p>
+              <a:p>
+                <a:pPr marL="171450" indent="-171450">
+                  <a:spcBef>
+                    <a:spcPts val="0"/>
+                  </a:spcBef>
+                  <a:buFont typeface="Arial" panose="020B0604020202020204" pitchFamily="34" charset="0"/>
+                  <a:buChar char="•"/>
+                </a:pPr>
+                <a:r>
+                  <a:rPr lang="en-US" sz="1200" dirty="0"/>
+                  <a:t>Frequently used to allow data to span the scope of multiple files</a:t>
+                </a:r>
+              </a:p>
+              <a:p>
+                <a:pPr marL="171450" indent="-171450">
+                  <a:spcBef>
+                    <a:spcPts val="0"/>
+                  </a:spcBef>
+                  <a:buFont typeface="Arial" panose="020B0604020202020204" pitchFamily="34" charset="0"/>
+                  <a:buChar char="•"/>
+                </a:pPr>
+                <a:r>
+                  <a:rPr lang="en-US" sz="1200" dirty="0"/>
+                  <a:t>Note: if you include a definition AND the extern keyword, the extern is ignored:</a:t>
+                </a:r>
+              </a:p>
+              <a:p>
+                <a:pPr marL="396875" lvl="1" indent="-171450">
+                  <a:spcBef>
+                    <a:spcPts val="0"/>
+                  </a:spcBef>
+                  <a:buFont typeface="Arial" panose="020B0604020202020204" pitchFamily="34" charset="0"/>
+                  <a:buChar char="•"/>
+                </a:pPr>
+                <a:endParaRPr lang="en-US" sz="1200" dirty="0"/>
+              </a:p>
+              <a:p>
+                <a:pPr>
+                  <a:spcBef>
+                    <a:spcPts val="0"/>
+                  </a:spcBef>
+                </a:pPr>
+                <a:endParaRPr lang="en-US" sz="1200" dirty="0"/>
+              </a:p>
+              <a:p>
+                <a:pPr marL="396875" lvl="1" indent="-171450">
+                  <a:spcBef>
+                    <a:spcPts val="0"/>
+                  </a:spcBef>
+                  <a:buFont typeface="Arial" panose="020B0604020202020204" pitchFamily="34" charset="0"/>
+                  <a:buChar char="•"/>
+                </a:pPr>
+                <a:r>
+                  <a:rPr lang="en-US" sz="1200" dirty="0"/>
+                  <a:t>The line above is seen by the compiler as:</a:t>
+                </a:r>
+              </a:p>
+              <a:p>
+                <a:pPr marL="396875" lvl="1" indent="-171450">
+                  <a:spcBef>
+                    <a:spcPts val="0"/>
+                  </a:spcBef>
+                  <a:buFont typeface="Arial" panose="020B0604020202020204" pitchFamily="34" charset="0"/>
+                  <a:buChar char="•"/>
+                </a:pPr>
+                <a:endParaRPr lang="en-US" sz="1200" dirty="0"/>
+              </a:p>
+              <a:p>
+                <a:pPr marL="396875" lvl="1" indent="-171450">
+                  <a:spcBef>
+                    <a:spcPts val="0"/>
+                  </a:spcBef>
+                  <a:buFont typeface="Arial" panose="020B0604020202020204" pitchFamily="34" charset="0"/>
+                  <a:buChar char="•"/>
+                </a:pPr>
+                <a:endParaRPr lang="en-US" sz="1200" dirty="0"/>
+              </a:p>
+              <a:p>
+                <a:pPr marL="396875" lvl="1" indent="-171450">
+                  <a:spcBef>
+                    <a:spcPts val="0"/>
+                  </a:spcBef>
+                  <a:buFont typeface="Arial" panose="020B0604020202020204" pitchFamily="34" charset="0"/>
+                  <a:buChar char="•"/>
+                </a:pPr>
+                <a:endParaRPr lang="en-US" sz="1200" dirty="0"/>
+              </a:p>
+              <a:p>
+                <a:pPr marL="171450" indent="-171450">
+                  <a:spcBef>
+                    <a:spcPts val="0"/>
+                  </a:spcBef>
+                  <a:buFont typeface="Arial" panose="020B0604020202020204" pitchFamily="34" charset="0"/>
+                  <a:buChar char="•"/>
+                </a:pPr>
+                <a:r>
+                  <a:rPr lang="en-US" sz="1200" dirty="0"/>
+                  <a:t>So, the extern keyword is used to tell the compiler that the variable exists somewhere</a:t>
+                </a:r>
+              </a:p>
+              <a:p>
+                <a:pPr marL="171450" indent="-171450">
+                  <a:spcBef>
+                    <a:spcPts val="0"/>
+                  </a:spcBef>
+                  <a:buFont typeface="Arial" panose="020B0604020202020204" pitchFamily="34" charset="0"/>
+                  <a:buChar char="•"/>
+                </a:pPr>
+                <a:r>
+                  <a:rPr lang="en-US" sz="1200" dirty="0"/>
+                  <a:t>It does not tell anything else about that variable</a:t>
+                </a:r>
+              </a:p>
+              <a:p>
+                <a:pPr marL="396875" lvl="1" indent="-171450">
+                  <a:spcBef>
+                    <a:spcPts val="0"/>
+                  </a:spcBef>
+                  <a:buFont typeface="Arial" panose="020B0604020202020204" pitchFamily="34" charset="0"/>
+                  <a:buChar char="•"/>
+                </a:pPr>
+                <a:endParaRPr lang="en-US" sz="1200" dirty="0"/>
+              </a:p>
+              <a:p>
+                <a:pPr marL="171450" indent="-171450">
+                  <a:spcBef>
+                    <a:spcPts val="0"/>
+                  </a:spcBef>
+                  <a:buFont typeface="Arial" panose="020B0604020202020204" pitchFamily="34" charset="0"/>
+                  <a:buChar char="•"/>
+                </a:pPr>
+                <a:endParaRPr lang="en-US" sz="1200" dirty="0"/>
+              </a:p>
+              <a:p>
+                <a:pPr>
+                  <a:spcBef>
+                    <a:spcPts val="0"/>
+                  </a:spcBef>
+                </a:pPr>
+                <a:endParaRPr lang="en-US" sz="1200" dirty="0"/>
+              </a:p>
+              <a:p>
+                <a:pPr marL="171450" indent="-171450">
+                  <a:spcBef>
+                    <a:spcPts val="0"/>
+                  </a:spcBef>
+                  <a:buFont typeface="Arial" panose="020B0604020202020204" pitchFamily="34" charset="0"/>
+                  <a:buChar char="•"/>
+                </a:pPr>
+                <a:endParaRPr lang="en-US" sz="1200" dirty="0"/>
+              </a:p>
+            </p:txBody>
+          </p:sp>
+        </mc:Choice>
+        <mc:Fallback xmlns="">
+          <p:sp>
+            <p:nvSpPr>
+              <p:cNvPr id="4" name="Content Placeholder 3">
+                <a:extLst>
+                  <a:ext uri="{FF2B5EF4-FFF2-40B4-BE49-F238E27FC236}">
+                    <a16:creationId xmlns:a16="http://schemas.microsoft.com/office/drawing/2014/main" id="{4A82F0A8-9ABA-45A1-B114-4D9BE3C3D467}"/>
+                  </a:ext>
+                </a:extLst>
+              </p:cNvPr>
+              <p:cNvSpPr>
+                <a:spLocks noGrp="1" noRot="1" noChangeAspect="1" noMove="1" noResize="1" noEditPoints="1" noAdjustHandles="1" noChangeArrowheads="1" noChangeShapeType="1" noTextEdit="1"/>
+              </p:cNvSpPr>
+              <p:nvPr>
+                <p:ph sz="quarter" idx="13"/>
+              </p:nvPr>
+            </p:nvSpPr>
+            <p:spPr>
+              <a:xfrm>
+                <a:off x="275101" y="652910"/>
+                <a:ext cx="8228012" cy="4010826"/>
+              </a:xfrm>
+              <a:blipFill>
+                <a:blip r:embed="rId2"/>
+                <a:stretch>
+                  <a:fillRect l="-1037" t="-1216"/>
+                </a:stretch>
+              </a:blipFill>
+            </p:spPr>
+            <p:txBody>
+              <a:bodyPr/>
+              <a:lstStyle/>
+              <a:p>
+                <a:r>
+                  <a:rPr lang="en-US">
+                    <a:noFill/>
+                  </a:rPr>
+                  <a:t> </a:t>
+                </a:r>
+              </a:p>
+            </p:txBody>
+          </p:sp>
+        </mc:Fallback>
+      </mc:AlternateContent>
+      <p:pic>
+        <p:nvPicPr>
+          <p:cNvPr id="7" name="Picture 6">
+            <a:extLst>
+              <a:ext uri="{FF2B5EF4-FFF2-40B4-BE49-F238E27FC236}">
+                <a16:creationId xmlns:a16="http://schemas.microsoft.com/office/drawing/2014/main" id="{DB2D5642-3D41-4557-9B91-8D0975366CCD}"/>
+              </a:ext>
+            </a:extLst>
+          </p:cNvPr>
+          <p:cNvPicPr>
+            <a:picLocks noChangeAspect="1"/>
+          </p:cNvPicPr>
+          <p:nvPr/>
+        </p:nvPicPr>
+        <p:blipFill>
+          <a:blip r:embed="rId3"/>
+          <a:stretch>
+            <a:fillRect/>
+          </a:stretch>
+        </p:blipFill>
+        <p:spPr>
+          <a:xfrm>
+            <a:off x="1295254" y="1275051"/>
+            <a:ext cx="1381125" cy="238125"/>
+          </a:xfrm>
+          <a:prstGeom prst="rect">
+            <a:avLst/>
+          </a:prstGeom>
+        </p:spPr>
+      </p:pic>
+      <p:pic>
+        <p:nvPicPr>
+          <p:cNvPr id="9" name="Picture 8">
+            <a:extLst>
+              <a:ext uri="{FF2B5EF4-FFF2-40B4-BE49-F238E27FC236}">
+                <a16:creationId xmlns:a16="http://schemas.microsoft.com/office/drawing/2014/main" id="{8A885599-8355-4E76-94B4-1C488B1031CA}"/>
+              </a:ext>
+            </a:extLst>
+          </p:cNvPr>
+          <p:cNvPicPr>
+            <a:picLocks noChangeAspect="1"/>
+          </p:cNvPicPr>
+          <p:nvPr/>
+        </p:nvPicPr>
+        <p:blipFill>
+          <a:blip r:embed="rId4"/>
+          <a:stretch>
+            <a:fillRect/>
+          </a:stretch>
+        </p:blipFill>
+        <p:spPr>
+          <a:xfrm>
+            <a:off x="1295254" y="2190252"/>
+            <a:ext cx="1771650" cy="304800"/>
+          </a:xfrm>
+          <a:prstGeom prst="rect">
+            <a:avLst/>
+          </a:prstGeom>
+        </p:spPr>
+      </p:pic>
+      <p:pic>
+        <p:nvPicPr>
+          <p:cNvPr id="10" name="Picture 9">
+            <a:extLst>
+              <a:ext uri="{FF2B5EF4-FFF2-40B4-BE49-F238E27FC236}">
+                <a16:creationId xmlns:a16="http://schemas.microsoft.com/office/drawing/2014/main" id="{68102881-7676-4F07-BBA5-CB8712697855}"/>
+              </a:ext>
+            </a:extLst>
+          </p:cNvPr>
+          <p:cNvPicPr>
+            <a:picLocks noChangeAspect="1"/>
+          </p:cNvPicPr>
+          <p:nvPr/>
+        </p:nvPicPr>
+        <p:blipFill>
+          <a:blip r:embed="rId5"/>
+          <a:stretch>
+            <a:fillRect/>
+          </a:stretch>
+        </p:blipFill>
+        <p:spPr>
+          <a:xfrm>
+            <a:off x="1295254" y="2677445"/>
+            <a:ext cx="1009650" cy="285750"/>
+          </a:xfrm>
+          <a:prstGeom prst="rect">
+            <a:avLst/>
+          </a:prstGeom>
+        </p:spPr>
+      </p:pic>
+    </p:spTree>
+    <p:extLst>
+      <p:ext uri="{BB962C8B-B14F-4D97-AF65-F5344CB8AC3E}">
+        <p14:creationId xmlns:p14="http://schemas.microsoft.com/office/powerpoint/2010/main" val="600970959"/>
+      </p:ext>
+    </p:extLst>
+  </p:cSld>
+  <p:clrMapOvr>
+    <a:masterClrMapping/>
+  </p:clrMapOvr>
+  <mc:AlternateContent xmlns:mc="http://schemas.openxmlformats.org/markup-compatibility/2006" xmlns:p14="http://schemas.microsoft.com/office/powerpoint/2010/main">
+    <mc:Choice Requires="p14">
+      <p:transition spd="med" p14:dur="700">
+        <p:fade/>
+      </p:transition>
+    </mc:Choice>
+    <mc:Fallback xmlns="">
+      <p:transition spd="med">
+        <p:fade/>
+      </p:transition>
+    </mc:Fallback>
+  </mc:AlternateContent>
+</p:sld>
+</file>
+
+<file path=ppt/slides/slide19.xml><?xml version="1.0" encoding="utf-8"?>
+<p:sld xmlns:a="http://schemas.openxmlformats.org/drawingml/2006/main" xmlns:r="http://schemas.openxmlformats.org/officeDocument/2006/relationships" xmlns:p="http://schemas.openxmlformats.org/presentationml/2006/main">
+  <p:cSld>
+    <p:spTree>
+      <p:nvGrpSpPr>
+        <p:cNvPr id="1" name=""/>
+        <p:cNvGrpSpPr/>
+        <p:nvPr/>
+      </p:nvGrpSpPr>
+      <p:grpSpPr>
+        <a:xfrm>
+          <a:off x="0" y="0"/>
+          <a:ext cx="0" cy="0"/>
+          <a:chOff x="0" y="0"/>
+          <a:chExt cx="0" cy="0"/>
+        </a:xfrm>
+      </p:grpSpPr>
+    </p:spTree>
+    <p:extLst>
+      <p:ext uri="{BB962C8B-B14F-4D97-AF65-F5344CB8AC3E}">
+        <p14:creationId xmlns:p14="http://schemas.microsoft.com/office/powerpoint/2010/main" val="2894152561"/>
+      </p:ext>
+    </p:extLst>
+  </p:cSld>
+  <p:clrMapOvr>
+    <a:masterClrMapping/>
+  </p:clrMapOvr>
+  <mc:AlternateContent xmlns:mc="http://schemas.openxmlformats.org/markup-compatibility/2006" xmlns:p14="http://schemas.microsoft.com/office/powerpoint/2010/main">
+    <mc:Choice Requires="p14">
+      <p:transition spd="med" p14:dur="700">
+        <p:fade/>
+      </p:transition>
+    </mc:Choice>
+    <mc:Fallback xmlns="">
+      <p:transition spd="med">
+        <p:fade/>
+      </p:transition>
+    </mc:Fallback>
+  </mc:AlternateContent>
+</p:sld>
+</file>
+
 <file path=ppt/slides/slide2.xml><?xml version="1.0" encoding="utf-8"?>
 <p:sld xmlns:a="http://schemas.openxmlformats.org/drawingml/2006/main" xmlns:r="http://schemas.openxmlformats.org/officeDocument/2006/relationships" xmlns:p="http://schemas.openxmlformats.org/presentationml/2006/main">
   <p:cSld>
@@ -13631,6 +17483,128 @@
               <a:buFont typeface="Arial" panose="020B0604020202020204" pitchFamily="34" charset="0"/>
               <a:buChar char="•"/>
             </a:pPr>
+            <a:r>
+              <a:rPr lang="en-US" sz="1200" b="1" dirty="0"/>
+              <a:t>Constructor: </a:t>
+            </a:r>
+            <a:r>
+              <a:rPr lang="en-US" sz="1200" dirty="0"/>
+              <a:t>a special member function, executed whenever we create new objects of the class</a:t>
+            </a:r>
+          </a:p>
+          <a:p>
+            <a:pPr marL="396875" lvl="1" indent="-171450">
+              <a:spcBef>
+                <a:spcPts val="300"/>
+              </a:spcBef>
+              <a:buFont typeface="Arial" panose="020B0604020202020204" pitchFamily="34" charset="0"/>
+              <a:buChar char="•"/>
+            </a:pPr>
+            <a:r>
+              <a:rPr lang="en-US" sz="1200" dirty="0"/>
+              <a:t>Have the exact same name as the class</a:t>
+            </a:r>
+          </a:p>
+          <a:p>
+            <a:pPr marL="396875" lvl="1" indent="-171450">
+              <a:spcBef>
+                <a:spcPts val="300"/>
+              </a:spcBef>
+              <a:buFont typeface="Arial" panose="020B0604020202020204" pitchFamily="34" charset="0"/>
+              <a:buChar char="•"/>
+            </a:pPr>
+            <a:r>
+              <a:rPr lang="en-US" sz="1200" dirty="0"/>
+              <a:t>Does not have any return type</a:t>
+            </a:r>
+          </a:p>
+          <a:p>
+            <a:pPr marL="396875" lvl="1" indent="-171450">
+              <a:spcBef>
+                <a:spcPts val="300"/>
+              </a:spcBef>
+              <a:buFont typeface="Arial" panose="020B0604020202020204" pitchFamily="34" charset="0"/>
+              <a:buChar char="•"/>
+            </a:pPr>
+            <a:r>
+              <a:rPr lang="en-US" sz="1200" dirty="0"/>
+              <a:t>Useful for setting initial values for member variables</a:t>
+            </a:r>
+          </a:p>
+          <a:p>
+            <a:pPr marL="171450" indent="-171450">
+              <a:spcBef>
+                <a:spcPts val="300"/>
+              </a:spcBef>
+              <a:buFont typeface="Arial" panose="020B0604020202020204" pitchFamily="34" charset="0"/>
+              <a:buChar char="•"/>
+            </a:pPr>
+            <a:r>
+              <a:rPr lang="en-US" sz="1200" b="1" dirty="0"/>
+              <a:t>Destructor: </a:t>
+            </a:r>
+            <a:r>
+              <a:rPr lang="en-US" sz="1200" dirty="0"/>
+              <a:t>a special member function, executed the class is deleted or released</a:t>
+            </a:r>
+          </a:p>
+          <a:p>
+            <a:pPr marL="396875" lvl="1" indent="-171450">
+              <a:spcBef>
+                <a:spcPts val="300"/>
+              </a:spcBef>
+              <a:buFont typeface="Arial" panose="020B0604020202020204" pitchFamily="34" charset="0"/>
+              <a:buChar char="•"/>
+            </a:pPr>
+            <a:r>
+              <a:rPr lang="en-US" sz="1200" dirty="0"/>
+              <a:t>Have the exact same name as the class prefixed with a tilde (~)</a:t>
+            </a:r>
+          </a:p>
+          <a:p>
+            <a:pPr marL="396875" lvl="1" indent="-171450">
+              <a:spcBef>
+                <a:spcPts val="300"/>
+              </a:spcBef>
+              <a:buFont typeface="Arial" panose="020B0604020202020204" pitchFamily="34" charset="0"/>
+              <a:buChar char="•"/>
+            </a:pPr>
+            <a:r>
+              <a:rPr lang="en-US" sz="1200" dirty="0"/>
+              <a:t>It can neither return a value or take any parameters</a:t>
+            </a:r>
+          </a:p>
+          <a:p>
+            <a:pPr marL="396875" lvl="1" indent="-171450">
+              <a:spcBef>
+                <a:spcPts val="300"/>
+              </a:spcBef>
+              <a:buFont typeface="Arial" panose="020B0604020202020204" pitchFamily="34" charset="0"/>
+              <a:buChar char="•"/>
+            </a:pPr>
+            <a:r>
+              <a:rPr lang="en-US" sz="1200" dirty="0"/>
+              <a:t>Useful for releasing resources like releasing memories and closing files</a:t>
+            </a:r>
+          </a:p>
+          <a:p>
+            <a:pPr marL="396875" lvl="1" indent="-171450">
+              <a:spcBef>
+                <a:spcPts val="300"/>
+              </a:spcBef>
+              <a:buFont typeface="Arial" panose="020B0604020202020204" pitchFamily="34" charset="0"/>
+              <a:buChar char="•"/>
+            </a:pPr>
+            <a:endParaRPr lang="en-US" sz="1200" dirty="0"/>
+          </a:p>
+          <a:p>
+            <a:pPr marL="171450" indent="-171450">
+              <a:spcBef>
+                <a:spcPts val="300"/>
+              </a:spcBef>
+              <a:buFont typeface="Arial" panose="020B0604020202020204" pitchFamily="34" charset="0"/>
+              <a:buChar char="•"/>
+            </a:pPr>
             <a:endParaRPr lang="en-US" sz="1200" dirty="0"/>
           </a:p>
           <a:p>
@@ -13764,69 +17738,84 @@
           <a:lstStyle/>
           <a:p>
             <a:r>
-              <a:rPr lang="en-US" dirty="0"/>
-              <a:t>Temp</a:t>
-            </a:r>
+              <a:rPr lang="en-US" sz="3600" dirty="0"/>
+              <a:t>Class in </a:t>
+            </a:r>
+            <a:r>
+              <a:rPr lang="en-US" sz="3600" dirty="0" err="1"/>
+              <a:t>c++</a:t>
+            </a:r>
+            <a:br>
+              <a:rPr lang="en-US" sz="3600" dirty="0"/>
+            </a:br>
+            <a:endParaRPr lang="en-US" dirty="0"/>
           </a:p>
         </p:txBody>
       </p:sp>
-      <p:sp>
-        <p:nvSpPr>
-          <p:cNvPr id="4" name="Content Placeholder 3">
+      <p:pic>
+        <p:nvPicPr>
+          <p:cNvPr id="7" name="Picture 6">
             <a:extLst>
               <a:ext uri="{FF2B5EF4-FFF2-40B4-BE49-F238E27FC236}">
-                <a16:creationId xmlns:a16="http://schemas.microsoft.com/office/drawing/2014/main" id="{4A82F0A8-9ABA-45A1-B114-4D9BE3C3D467}"/>
+                <a16:creationId xmlns:a16="http://schemas.microsoft.com/office/drawing/2014/main" id="{D9B6B668-1923-4BD9-ADEA-30235FF5FE22}"/>
               </a:ext>
             </a:extLst>
           </p:cNvPr>
-          <p:cNvSpPr>
-            <a:spLocks noGrp="1"/>
-          </p:cNvSpPr>
-          <p:nvPr>
-            <p:ph sz="quarter" idx="13"/>
-          </p:nvPr>
-        </p:nvSpPr>
+          <p:cNvPicPr>
+            <a:picLocks noChangeAspect="1"/>
+          </p:cNvPicPr>
+          <p:nvPr/>
+        </p:nvPicPr>
+        <p:blipFill>
+          <a:blip r:embed="rId2"/>
+          <a:stretch>
+            <a:fillRect/>
+          </a:stretch>
+        </p:blipFill>
         <p:spPr>
           <a:xfrm>
-            <a:off x="275101" y="652910"/>
-            <a:ext cx="8228012" cy="4010826"/>
-          </a:xfrm>
-        </p:spPr>
-        <p:txBody>
-          <a:bodyPr/>
-          <a:lstStyle/>
-          <a:p>
-            <a:pPr marL="171450" indent="-171450">
-              <a:spcBef>
-                <a:spcPts val="0"/>
-              </a:spcBef>
-              <a:buFont typeface="Arial" panose="020B0604020202020204" pitchFamily="34" charset="0"/>
-              <a:buChar char="•"/>
-            </a:pPr>
-            <a:r>
-              <a:rPr lang="en-US" sz="1200" dirty="0"/>
-              <a:t>AAA</a:t>
-            </a:r>
-          </a:p>
-          <a:p>
-            <a:pPr marL="171450" indent="-171450">
-              <a:spcBef>
-                <a:spcPts val="0"/>
-              </a:spcBef>
-              <a:buFont typeface="Arial" panose="020B0604020202020204" pitchFamily="34" charset="0"/>
-              <a:buChar char="•"/>
-            </a:pPr>
-            <a:r>
-              <a:rPr lang="en-US" sz="1200" dirty="0"/>
-              <a:t>BBB</a:t>
-            </a:r>
-          </a:p>
-        </p:txBody>
-      </p:sp>
+            <a:off x="275101" y="601451"/>
+            <a:ext cx="6487863" cy="2167150"/>
+          </a:xfrm>
+          <a:prstGeom prst="rect">
+            <a:avLst/>
+          </a:prstGeom>
+        </p:spPr>
+      </p:pic>
+      <p:pic>
+        <p:nvPicPr>
+          <p:cNvPr id="8" name="Picture 7">
+            <a:extLst>
+              <a:ext uri="{FF2B5EF4-FFF2-40B4-BE49-F238E27FC236}">
+                <a16:creationId xmlns:a16="http://schemas.microsoft.com/office/drawing/2014/main" id="{C55017AC-8737-4421-A118-08BD764EC37A}"/>
+              </a:ext>
+            </a:extLst>
+          </p:cNvPr>
+          <p:cNvPicPr>
+            <a:picLocks noChangeAspect="1"/>
+          </p:cNvPicPr>
+          <p:nvPr/>
+        </p:nvPicPr>
+        <p:blipFill>
+          <a:blip r:embed="rId3"/>
+          <a:stretch>
+            <a:fillRect/>
+          </a:stretch>
+        </p:blipFill>
+        <p:spPr>
+          <a:xfrm>
+            <a:off x="275101" y="2986041"/>
+            <a:ext cx="3848637" cy="657317"/>
+          </a:xfrm>
+          <a:prstGeom prst="rect">
+            <a:avLst/>
+          </a:prstGeom>
+        </p:spPr>
+      </p:pic>
     </p:spTree>
     <p:extLst>
       <p:ext uri="{BB962C8B-B14F-4D97-AF65-F5344CB8AC3E}">
-        <p14:creationId xmlns:p14="http://schemas.microsoft.com/office/powerpoint/2010/main" val="2461861099"/>
+        <p14:creationId xmlns:p14="http://schemas.microsoft.com/office/powerpoint/2010/main" val="428594937"/>
       </p:ext>
     </p:extLst>
   </p:cSld>
@@ -13865,10 +17854,252 @@
           <a:chExt cx="0" cy="0"/>
         </a:xfrm>
       </p:grpSpPr>
+      <p:sp>
+        <p:nvSpPr>
+          <p:cNvPr id="2" name="Slide Number Placeholder 1">
+            <a:extLst>
+              <a:ext uri="{FF2B5EF4-FFF2-40B4-BE49-F238E27FC236}">
+                <a16:creationId xmlns:a16="http://schemas.microsoft.com/office/drawing/2014/main" id="{8B20FB39-703A-48E0-828C-2B17F1058F82}"/>
+              </a:ext>
+            </a:extLst>
+          </p:cNvPr>
+          <p:cNvSpPr>
+            <a:spLocks noGrp="1"/>
+          </p:cNvSpPr>
+          <p:nvPr>
+            <p:ph type="sldNum" sz="quarter" idx="12"/>
+          </p:nvPr>
+        </p:nvSpPr>
+        <p:spPr/>
+        <p:txBody>
+          <a:bodyPr/>
+          <a:lstStyle/>
+          <a:p>
+            <a:fld id="{EE2556C5-CE8C-6547-B838-EA80C61A4AF7}" type="slidenum">
+              <a:rPr lang="en-US" smtClean="0"/>
+              <a:pPr/>
+              <a:t>9</a:t>
+            </a:fld>
+            <a:endParaRPr lang="en-US" dirty="0"/>
+          </a:p>
+        </p:txBody>
+      </p:sp>
+      <p:sp>
+        <p:nvSpPr>
+          <p:cNvPr id="3" name="Title 2">
+            <a:extLst>
+              <a:ext uri="{FF2B5EF4-FFF2-40B4-BE49-F238E27FC236}">
+                <a16:creationId xmlns:a16="http://schemas.microsoft.com/office/drawing/2014/main" id="{D50145E5-5498-46C8-89CD-9BD450C5FC0B}"/>
+              </a:ext>
+            </a:extLst>
+          </p:cNvPr>
+          <p:cNvSpPr>
+            <a:spLocks noGrp="1"/>
+          </p:cNvSpPr>
+          <p:nvPr>
+            <p:ph type="title"/>
+          </p:nvPr>
+        </p:nvSpPr>
+        <p:spPr>
+          <a:xfrm>
+            <a:off x="275101" y="80010"/>
+            <a:ext cx="8229600" cy="390507"/>
+          </a:xfrm>
+        </p:spPr>
+        <p:txBody>
+          <a:bodyPr/>
+          <a:lstStyle/>
+          <a:p>
+            <a:r>
+              <a:rPr lang="en-US" sz="3600" dirty="0"/>
+              <a:t>Inheritance</a:t>
+            </a:r>
+            <a:br>
+              <a:rPr lang="en-US" sz="3600" dirty="0"/>
+            </a:br>
+            <a:endParaRPr lang="en-US" dirty="0"/>
+          </a:p>
+        </p:txBody>
+      </p:sp>
+      <p:sp>
+        <p:nvSpPr>
+          <p:cNvPr id="4" name="Content Placeholder 3">
+            <a:extLst>
+              <a:ext uri="{FF2B5EF4-FFF2-40B4-BE49-F238E27FC236}">
+                <a16:creationId xmlns:a16="http://schemas.microsoft.com/office/drawing/2014/main" id="{4A82F0A8-9ABA-45A1-B114-4D9BE3C3D467}"/>
+              </a:ext>
+            </a:extLst>
+          </p:cNvPr>
+          <p:cNvSpPr>
+            <a:spLocks noGrp="1"/>
+          </p:cNvSpPr>
+          <p:nvPr>
+            <p:ph sz="quarter" idx="13"/>
+          </p:nvPr>
+        </p:nvSpPr>
+        <p:spPr>
+          <a:xfrm>
+            <a:off x="275101" y="652910"/>
+            <a:ext cx="8228012" cy="4010826"/>
+          </a:xfrm>
+        </p:spPr>
+        <p:txBody>
+          <a:bodyPr/>
+          <a:lstStyle/>
+          <a:p>
+            <a:pPr marL="171450" indent="-171450">
+              <a:spcBef>
+                <a:spcPts val="300"/>
+              </a:spcBef>
+              <a:buFont typeface="Arial" panose="020B0604020202020204" pitchFamily="34" charset="0"/>
+              <a:buChar char="•"/>
+            </a:pPr>
+            <a:r>
+              <a:rPr lang="en-US" sz="1200" dirty="0"/>
+              <a:t>Once we have a class we can inherit from it to form a new class with expanded capabilities</a:t>
+            </a:r>
+          </a:p>
+          <a:p>
+            <a:pPr marL="396875" lvl="1" indent="-171450">
+              <a:spcBef>
+                <a:spcPts val="300"/>
+              </a:spcBef>
+              <a:buFont typeface="Arial" panose="020B0604020202020204" pitchFamily="34" charset="0"/>
+              <a:buChar char="•"/>
+            </a:pPr>
+            <a:r>
+              <a:rPr lang="en-US" sz="1200" b="1" dirty="0"/>
+              <a:t>Derived </a:t>
+            </a:r>
+            <a:r>
+              <a:rPr lang="en-US" sz="1200" dirty="0"/>
+              <a:t>class (child): the class that inherits from another class</a:t>
+            </a:r>
+          </a:p>
+          <a:p>
+            <a:pPr marL="396875" lvl="1" indent="-171450">
+              <a:spcBef>
+                <a:spcPts val="300"/>
+              </a:spcBef>
+              <a:buFont typeface="Arial" panose="020B0604020202020204" pitchFamily="34" charset="0"/>
+              <a:buChar char="•"/>
+            </a:pPr>
+            <a:r>
+              <a:rPr lang="en-US" sz="1200" b="1" dirty="0"/>
+              <a:t>Base</a:t>
+            </a:r>
+            <a:r>
+              <a:rPr lang="en-US" sz="1200" dirty="0"/>
+              <a:t> class (parent): the class being inherited from</a:t>
+            </a:r>
+          </a:p>
+          <a:p>
+            <a:pPr marL="171450" indent="-171450">
+              <a:spcBef>
+                <a:spcPts val="300"/>
+              </a:spcBef>
+              <a:buFont typeface="Arial" panose="020B0604020202020204" pitchFamily="34" charset="0"/>
+              <a:buChar char="•"/>
+            </a:pPr>
+            <a:r>
+              <a:rPr lang="en-US" sz="1200" dirty="0"/>
+              <a:t>To inherit from a class we use the “:” symbol</a:t>
+            </a:r>
+          </a:p>
+          <a:p>
+            <a:pPr marL="171450" indent="-171450">
+              <a:buFont typeface="Arial" panose="020B0604020202020204" pitchFamily="34" charset="0"/>
+              <a:buChar char="•"/>
+            </a:pPr>
+            <a:r>
+              <a:rPr lang="en-US" sz="1200" dirty="0"/>
+              <a:t>Multiple Inheritance: a class can also be derived from more than one base class</a:t>
+            </a:r>
+          </a:p>
+          <a:p>
+            <a:pPr marL="171450" indent="-171450">
+              <a:buFont typeface="Arial" panose="020B0604020202020204" pitchFamily="34" charset="0"/>
+              <a:buChar char="•"/>
+            </a:pPr>
+            <a:r>
+              <a:rPr lang="en-US" sz="1200" dirty="0"/>
+              <a:t>Access Specifiers:</a:t>
+            </a:r>
+          </a:p>
+          <a:p>
+            <a:pPr marL="396875" lvl="1" indent="-171450">
+              <a:buFont typeface="Arial" panose="020B0604020202020204" pitchFamily="34" charset="0"/>
+              <a:buChar char="•"/>
+            </a:pPr>
+            <a:r>
+              <a:rPr lang="en-US" sz="1200" dirty="0"/>
+              <a:t>Public: members of a class are accessible from outside the class</a:t>
+            </a:r>
+          </a:p>
+          <a:p>
+            <a:pPr marL="396875" lvl="1" indent="-171450">
+              <a:buFont typeface="Arial" panose="020B0604020202020204" pitchFamily="34" charset="0"/>
+              <a:buChar char="•"/>
+            </a:pPr>
+            <a:r>
+              <a:rPr lang="en-US" sz="1200" dirty="0"/>
+              <a:t>Private: members can only be accessed within the class</a:t>
+            </a:r>
+          </a:p>
+          <a:p>
+            <a:pPr marL="396875" lvl="1" indent="-171450">
+              <a:buFont typeface="Arial" panose="020B0604020202020204" pitchFamily="34" charset="0"/>
+              <a:buChar char="•"/>
+            </a:pPr>
+            <a:r>
+              <a:rPr lang="en-US" sz="1200" dirty="0">
+                <a:highlight>
+                  <a:srgbClr val="FFFF00"/>
+                </a:highlight>
+              </a:rPr>
+              <a:t>Protected</a:t>
+            </a:r>
+            <a:r>
+              <a:rPr lang="en-US" sz="1200" dirty="0"/>
+              <a:t>: members cab be accessed within the class and in the inherited class.</a:t>
+            </a:r>
+          </a:p>
+          <a:p>
+            <a:pPr marL="171450" indent="-171450">
+              <a:spcBef>
+                <a:spcPts val="300"/>
+              </a:spcBef>
+              <a:buFont typeface="Arial" panose="020B0604020202020204" pitchFamily="34" charset="0"/>
+              <a:buChar char="•"/>
+            </a:pPr>
+            <a:endParaRPr lang="en-US" sz="1200" dirty="0"/>
+          </a:p>
+          <a:p>
+            <a:pPr marL="171450" indent="-171450">
+              <a:spcBef>
+                <a:spcPts val="300"/>
+              </a:spcBef>
+              <a:buFont typeface="Arial" panose="020B0604020202020204" pitchFamily="34" charset="0"/>
+              <a:buChar char="•"/>
+            </a:pPr>
+            <a:endParaRPr lang="en-US" sz="1200" dirty="0"/>
+          </a:p>
+          <a:p>
+            <a:pPr marL="171450" indent="-171450">
+              <a:spcBef>
+                <a:spcPts val="300"/>
+              </a:spcBef>
+              <a:buFont typeface="Arial" panose="020B0604020202020204" pitchFamily="34" charset="0"/>
+              <a:buChar char="•"/>
+            </a:pPr>
+            <a:endParaRPr lang="en-US" sz="1200" dirty="0"/>
+          </a:p>
+        </p:txBody>
+      </p:sp>
     </p:spTree>
     <p:extLst>
       <p:ext uri="{BB962C8B-B14F-4D97-AF65-F5344CB8AC3E}">
-        <p14:creationId xmlns:p14="http://schemas.microsoft.com/office/powerpoint/2010/main" val="2894152561"/>
+        <p14:creationId xmlns:p14="http://schemas.microsoft.com/office/powerpoint/2010/main" val="4243919968"/>
       </p:ext>
     </p:extLst>
   </p:cSld>

</xml_diff>